<commit_message>
add feedback and ppt file
</commit_message>
<xml_diff>
--- a/docs/DEF-LEF to SVG.pptx
+++ b/docs/DEF-LEF to SVG.pptx
@@ -7,17 +7,21 @@
   <p:sldIdLst>
     <p:sldId id="256" r:id="rId2"/>
     <p:sldId id="257" r:id="rId3"/>
-    <p:sldId id="258" r:id="rId4"/>
-    <p:sldId id="261" r:id="rId5"/>
-    <p:sldId id="262" r:id="rId6"/>
-    <p:sldId id="263" r:id="rId7"/>
-    <p:sldId id="264" r:id="rId8"/>
-    <p:sldId id="265" r:id="rId9"/>
-    <p:sldId id="266" r:id="rId10"/>
-    <p:sldId id="267" r:id="rId11"/>
-    <p:sldId id="268" r:id="rId12"/>
-    <p:sldId id="259" r:id="rId13"/>
-    <p:sldId id="260" r:id="rId14"/>
+    <p:sldId id="269" r:id="rId4"/>
+    <p:sldId id="258" r:id="rId5"/>
+    <p:sldId id="270" r:id="rId6"/>
+    <p:sldId id="261" r:id="rId7"/>
+    <p:sldId id="262" r:id="rId8"/>
+    <p:sldId id="263" r:id="rId9"/>
+    <p:sldId id="264" r:id="rId10"/>
+    <p:sldId id="265" r:id="rId11"/>
+    <p:sldId id="266" r:id="rId12"/>
+    <p:sldId id="271" r:id="rId13"/>
+    <p:sldId id="267" r:id="rId14"/>
+    <p:sldId id="259" r:id="rId15"/>
+    <p:sldId id="272" r:id="rId16"/>
+    <p:sldId id="273" r:id="rId17"/>
+    <p:sldId id="260" r:id="rId18"/>
   </p:sldIdLst>
   <p:sldSz cx="12192000" cy="6858000"/>
   <p:notesSz cx="6858000" cy="9144000"/>
@@ -350,7 +354,7 @@
           <a:p>
             <a:fld id="{9B4351EA-E64D-462A-8AA0-D6ABA8A204FE}" type="datetimeFigureOut">
               <a:rPr lang="en-US" smtClean="0"/>
-              <a:t>11/14/2019</a:t>
+              <a:t>12/3/2019</a:t>
             </a:fld>
             <a:endParaRPr lang="en-US"/>
           </a:p>
@@ -558,7 +562,7 @@
           <a:p>
             <a:fld id="{9B4351EA-E64D-462A-8AA0-D6ABA8A204FE}" type="datetimeFigureOut">
               <a:rPr lang="en-US" smtClean="0"/>
-              <a:t>11/14/2019</a:t>
+              <a:t>12/3/2019</a:t>
             </a:fld>
             <a:endParaRPr lang="en-US"/>
           </a:p>
@@ -814,7 +818,7 @@
           <a:p>
             <a:fld id="{9B4351EA-E64D-462A-8AA0-D6ABA8A204FE}" type="datetimeFigureOut">
               <a:rPr lang="en-US" smtClean="0"/>
-              <a:t>11/14/2019</a:t>
+              <a:t>12/3/2019</a:t>
             </a:fld>
             <a:endParaRPr lang="en-US"/>
           </a:p>
@@ -988,7 +992,7 @@
           <a:p>
             <a:fld id="{9B4351EA-E64D-462A-8AA0-D6ABA8A204FE}" type="datetimeFigureOut">
               <a:rPr lang="en-US" smtClean="0"/>
-              <a:t>11/14/2019</a:t>
+              <a:t>12/3/2019</a:t>
             </a:fld>
             <a:endParaRPr lang="en-US"/>
           </a:p>
@@ -1331,7 +1335,7 @@
           <a:p>
             <a:fld id="{9B4351EA-E64D-462A-8AA0-D6ABA8A204FE}" type="datetimeFigureOut">
               <a:rPr lang="en-US" smtClean="0"/>
-              <a:t>11/14/2019</a:t>
+              <a:t>12/3/2019</a:t>
             </a:fld>
             <a:endParaRPr lang="en-US"/>
           </a:p>
@@ -1606,7 +1610,7 @@
           <a:p>
             <a:fld id="{9B4351EA-E64D-462A-8AA0-D6ABA8A204FE}" type="datetimeFigureOut">
               <a:rPr lang="en-US" smtClean="0"/>
-              <a:t>11/14/2019</a:t>
+              <a:t>12/3/2019</a:t>
             </a:fld>
             <a:endParaRPr lang="en-US"/>
           </a:p>
@@ -1985,7 +1989,7 @@
           <a:p>
             <a:fld id="{9B4351EA-E64D-462A-8AA0-D6ABA8A204FE}" type="datetimeFigureOut">
               <a:rPr lang="en-US" smtClean="0"/>
-              <a:t>11/14/2019</a:t>
+              <a:t>12/3/2019</a:t>
             </a:fld>
             <a:endParaRPr lang="en-US"/>
           </a:p>
@@ -2103,7 +2107,7 @@
           <a:p>
             <a:fld id="{9B4351EA-E64D-462A-8AA0-D6ABA8A204FE}" type="datetimeFigureOut">
               <a:rPr lang="en-US" smtClean="0"/>
-              <a:t>11/14/2019</a:t>
+              <a:t>12/3/2019</a:t>
             </a:fld>
             <a:endParaRPr lang="en-US"/>
           </a:p>
@@ -2274,7 +2278,7 @@
           <a:p>
             <a:fld id="{9B4351EA-E64D-462A-8AA0-D6ABA8A204FE}" type="datetimeFigureOut">
               <a:rPr lang="en-US" smtClean="0"/>
-              <a:t>11/14/2019</a:t>
+              <a:t>12/3/2019</a:t>
             </a:fld>
             <a:endParaRPr lang="en-US"/>
           </a:p>
@@ -2628,7 +2632,7 @@
           <a:p>
             <a:fld id="{9B4351EA-E64D-462A-8AA0-D6ABA8A204FE}" type="datetimeFigureOut">
               <a:rPr lang="en-US" smtClean="0"/>
-              <a:t>11/14/2019</a:t>
+              <a:t>12/3/2019</a:t>
             </a:fld>
             <a:endParaRPr lang="en-US"/>
           </a:p>
@@ -3010,7 +3014,7 @@
           <a:p>
             <a:fld id="{9B4351EA-E64D-462A-8AA0-D6ABA8A204FE}" type="datetimeFigureOut">
               <a:rPr lang="en-US" smtClean="0"/>
-              <a:t>11/14/2019</a:t>
+              <a:t>12/3/2019</a:t>
             </a:fld>
             <a:endParaRPr lang="en-US"/>
           </a:p>
@@ -3297,7 +3301,7 @@
           <a:p>
             <a:fld id="{9B4351EA-E64D-462A-8AA0-D6ABA8A204FE}" type="datetimeFigureOut">
               <a:rPr lang="en-US" smtClean="0"/>
-              <a:t>11/14/2019</a:t>
+              <a:t>12/3/2019</a:t>
             </a:fld>
             <a:endParaRPr lang="en-US"/>
           </a:p>
@@ -3865,10 +3869,15 @@
             <p:ph type="subTitle" idx="1"/>
           </p:nvPr>
         </p:nvSpPr>
-        <p:spPr/>
+        <p:spPr>
+          <a:xfrm>
+            <a:off x="1100051" y="4455619"/>
+            <a:ext cx="10058400" cy="1523150"/>
+          </a:xfrm>
+        </p:spPr>
         <p:txBody>
           <a:bodyPr>
-            <a:normAutofit/>
+            <a:normAutofit fontScale="92500" lnSpcReduction="20000"/>
           </a:bodyPr>
           <a:lstStyle/>
           <a:p>
@@ -3886,6 +3895,22 @@
             <a:r>
               <a:rPr lang="en-US" sz="2000" dirty="0"/>
               <a:t>Ahmed Marzouk</a:t>
+            </a:r>
+          </a:p>
+          <a:p>
+            <a:r>
+              <a:rPr lang="en-US" sz="2000" dirty="0" err="1"/>
+              <a:t>Alaa</a:t>
+            </a:r>
+            <a:r>
+              <a:rPr lang="en-US" sz="2000" dirty="0"/>
+              <a:t> Mohamed</a:t>
+            </a:r>
+          </a:p>
+          <a:p>
+            <a:r>
+              <a:rPr lang="en-US" sz="2000" dirty="0"/>
+              <a:t>Ahmed Fayed</a:t>
             </a:r>
           </a:p>
         </p:txBody>
@@ -3906,6 +3931,14 @@
 <file path=ppt/slides/slide10.xml><?xml version="1.0" encoding="utf-8"?>
 <p:sld xmlns:a="http://schemas.openxmlformats.org/drawingml/2006/main" xmlns:r="http://schemas.openxmlformats.org/officeDocument/2006/relationships" xmlns:p="http://schemas.openxmlformats.org/presentationml/2006/main">
   <p:cSld>
+    <p:bg>
+      <p:bgPr>
+        <a:solidFill>
+          <a:schemeClr val="bg1"/>
+        </a:solidFill>
+        <a:effectLst/>
+      </p:bgPr>
+    </p:bg>
     <p:spTree>
       <p:nvGrpSpPr>
         <p:cNvPr id="1" name=""/>
@@ -3922,10 +3955,328 @@
       </p:grpSpPr>
       <p:sp>
         <p:nvSpPr>
+          <p:cNvPr id="25" name="Rectangle 24">
+            <a:extLst>
+              <a:ext uri="{FF2B5EF4-FFF2-40B4-BE49-F238E27FC236}">
+                <a16:creationId xmlns:a16="http://schemas.microsoft.com/office/drawing/2014/main" id="{4E4490D0-3672-446A-AC12-B4830333BDDD}"/>
+              </a:ext>
+              <a:ext uri="{C183D7F6-B498-43B3-948B-1728B52AA6E4}">
+                <adec:decorative xmlns:adec="http://schemas.microsoft.com/office/drawing/2017/decorative" val="1"/>
+              </a:ext>
+            </a:extLst>
+          </p:cNvPr>
+          <p:cNvSpPr>
+            <a:spLocks noGrp="1" noRot="1" noChangeAspect="1" noMove="1" noResize="1" noEditPoints="1" noAdjustHandles="1" noChangeArrowheads="1" noChangeShapeType="1" noTextEdit="1"/>
+          </p:cNvSpPr>
+          <p:nvPr>
+            <p:extLst>
+              <p:ext uri="{386F3935-93C4-4BCD-93E2-E3B085C9AB24}">
+                <p16:designElem xmlns:p16="http://schemas.microsoft.com/office/powerpoint/2015/main" val="1"/>
+              </p:ext>
+            </p:extLst>
+          </p:nvPr>
+        </p:nvSpPr>
+        <p:spPr>
+          <a:xfrm>
+            <a:off x="3175" y="6400800"/>
+            <a:ext cx="12188825" cy="457200"/>
+          </a:xfrm>
+          <a:prstGeom prst="rect">
+            <a:avLst/>
+          </a:prstGeom>
+          <a:solidFill>
+            <a:schemeClr val="accent2"/>
+          </a:solidFill>
+          <a:ln>
+            <a:noFill/>
+          </a:ln>
+        </p:spPr>
+        <p:style>
+          <a:lnRef idx="2">
+            <a:schemeClr val="accent1">
+              <a:shade val="50000"/>
+            </a:schemeClr>
+          </a:lnRef>
+          <a:fillRef idx="1">
+            <a:schemeClr val="accent1"/>
+          </a:fillRef>
+          <a:effectRef idx="0">
+            <a:schemeClr val="accent1"/>
+          </a:effectRef>
+          <a:fontRef idx="minor">
+            <a:schemeClr val="lt1"/>
+          </a:fontRef>
+        </p:style>
+      </p:sp>
+      <p:sp>
+        <p:nvSpPr>
+          <p:cNvPr id="27" name="Rectangle 26">
+            <a:extLst>
+              <a:ext uri="{FF2B5EF4-FFF2-40B4-BE49-F238E27FC236}">
+                <a16:creationId xmlns:a16="http://schemas.microsoft.com/office/drawing/2014/main" id="{39CB82C2-DF65-4EC1-8280-F201D50F570B}"/>
+              </a:ext>
+              <a:ext uri="{C183D7F6-B498-43B3-948B-1728B52AA6E4}">
+                <adec:decorative xmlns:adec="http://schemas.microsoft.com/office/drawing/2017/decorative" val="1"/>
+              </a:ext>
+            </a:extLst>
+          </p:cNvPr>
+          <p:cNvSpPr>
+            <a:spLocks noGrp="1" noRot="1" noChangeAspect="1" noMove="1" noResize="1" noEditPoints="1" noAdjustHandles="1" noChangeArrowheads="1" noChangeShapeType="1" noTextEdit="1"/>
+          </p:cNvSpPr>
+          <p:nvPr>
+            <p:extLst>
+              <p:ext uri="{386F3935-93C4-4BCD-93E2-E3B085C9AB24}">
+                <p16:designElem xmlns:p16="http://schemas.microsoft.com/office/powerpoint/2015/main" val="1"/>
+              </p:ext>
+            </p:extLst>
+          </p:nvPr>
+        </p:nvSpPr>
+        <p:spPr>
+          <a:xfrm>
+            <a:off x="15" y="6334316"/>
+            <a:ext cx="12188825" cy="64008"/>
+          </a:xfrm>
+          <a:prstGeom prst="rect">
+            <a:avLst/>
+          </a:prstGeom>
+          <a:solidFill>
+            <a:schemeClr val="accent1"/>
+          </a:solidFill>
+          <a:ln>
+            <a:noFill/>
+          </a:ln>
+        </p:spPr>
+        <p:style>
+          <a:lnRef idx="2">
+            <a:schemeClr val="accent1">
+              <a:shade val="50000"/>
+            </a:schemeClr>
+          </a:lnRef>
+          <a:fillRef idx="1">
+            <a:schemeClr val="accent1"/>
+          </a:fillRef>
+          <a:effectRef idx="0">
+            <a:schemeClr val="accent1"/>
+          </a:effectRef>
+          <a:fontRef idx="minor">
+            <a:schemeClr val="lt1"/>
+          </a:fontRef>
+        </p:style>
+      </p:sp>
+      <p:cxnSp>
+        <p:nvCxnSpPr>
+          <p:cNvPr id="29" name="Straight Connector 28">
+            <a:extLst>
+              <a:ext uri="{FF2B5EF4-FFF2-40B4-BE49-F238E27FC236}">
+                <a16:creationId xmlns:a16="http://schemas.microsoft.com/office/drawing/2014/main" id="{7E1D4427-852B-4B37-8E76-0E9F1810BA2A}"/>
+              </a:ext>
+              <a:ext uri="{C183D7F6-B498-43B3-948B-1728B52AA6E4}">
+                <adec:decorative xmlns:adec="http://schemas.microsoft.com/office/drawing/2017/decorative" val="1"/>
+              </a:ext>
+            </a:extLst>
+          </p:cNvPr>
+          <p:cNvCxnSpPr>
+            <a:cxnSpLocks noGrp="1" noRot="1" noChangeAspect="1" noMove="1" noResize="1" noEditPoints="1" noAdjustHandles="1" noChangeArrowheads="1" noChangeShapeType="1"/>
+          </p:cNvCxnSpPr>
+          <p:nvPr>
+            <p:extLst>
+              <p:ext uri="{386F3935-93C4-4BCD-93E2-E3B085C9AB24}">
+                <p16:designElem xmlns:p16="http://schemas.microsoft.com/office/powerpoint/2015/main" val="1"/>
+              </p:ext>
+            </p:extLst>
+          </p:nvPr>
+        </p:nvCxnSpPr>
+        <p:spPr>
+          <a:xfrm>
+            <a:off x="1207658" y="4343400"/>
+            <a:ext cx="9875520" cy="0"/>
+          </a:xfrm>
+          <a:prstGeom prst="line">
+            <a:avLst/>
+          </a:prstGeom>
+          <a:ln w="6350">
+            <a:solidFill>
+              <a:schemeClr val="tx1">
+                <a:lumMod val="50000"/>
+                <a:lumOff val="50000"/>
+              </a:schemeClr>
+            </a:solidFill>
+          </a:ln>
+        </p:spPr>
+        <p:style>
+          <a:lnRef idx="1">
+            <a:schemeClr val="accent1"/>
+          </a:lnRef>
+          <a:fillRef idx="0">
+            <a:schemeClr val="accent1"/>
+          </a:fillRef>
+          <a:effectRef idx="0">
+            <a:schemeClr val="accent1"/>
+          </a:effectRef>
+          <a:fontRef idx="minor">
+            <a:schemeClr val="tx1"/>
+          </a:fontRef>
+        </p:style>
+      </p:cxnSp>
+      <p:sp useBgFill="1">
+        <p:nvSpPr>
+          <p:cNvPr id="31" name="Rectangle 30">
+            <a:extLst>
+              <a:ext uri="{FF2B5EF4-FFF2-40B4-BE49-F238E27FC236}">
+                <a16:creationId xmlns:a16="http://schemas.microsoft.com/office/drawing/2014/main" id="{5A1B47C8-47A0-4A88-8830-6DEA3B5DE392}"/>
+              </a:ext>
+              <a:ext uri="{C183D7F6-B498-43B3-948B-1728B52AA6E4}">
+                <adec:decorative xmlns:adec="http://schemas.microsoft.com/office/drawing/2017/decorative" val="1"/>
+              </a:ext>
+            </a:extLst>
+          </p:cNvPr>
+          <p:cNvSpPr>
+            <a:spLocks noGrp="1" noRot="1" noChangeAspect="1" noMove="1" noResize="1" noEditPoints="1" noAdjustHandles="1" noChangeArrowheads="1" noChangeShapeType="1" noTextEdit="1"/>
+          </p:cNvSpPr>
+          <p:nvPr>
+            <p:extLst>
+              <p:ext uri="{386F3935-93C4-4BCD-93E2-E3B085C9AB24}">
+                <p16:designElem xmlns:p16="http://schemas.microsoft.com/office/powerpoint/2015/main" val="1"/>
+              </p:ext>
+            </p:extLst>
+          </p:nvPr>
+        </p:nvSpPr>
+        <p:spPr>
+          <a:xfrm>
+            <a:off x="0" y="0"/>
+            <a:ext cx="12192000" cy="6858000"/>
+          </a:xfrm>
+          <a:prstGeom prst="rect">
+            <a:avLst/>
+          </a:prstGeom>
+          <a:ln>
+            <a:noFill/>
+          </a:ln>
+        </p:spPr>
+        <p:style>
+          <a:lnRef idx="2">
+            <a:schemeClr val="accent1">
+              <a:shade val="50000"/>
+            </a:schemeClr>
+          </a:lnRef>
+          <a:fillRef idx="1001">
+            <a:schemeClr val="lt1"/>
+          </a:fillRef>
+          <a:effectRef idx="0">
+            <a:schemeClr val="accent1"/>
+          </a:effectRef>
+          <a:fontRef idx="minor">
+            <a:schemeClr val="lt1"/>
+          </a:fontRef>
+        </p:style>
+        <p:txBody>
+          <a:bodyPr rtlCol="0" anchor="ctr"/>
+          <a:lstStyle/>
+          <a:p>
+            <a:pPr algn="ctr"/>
+            <a:endParaRPr lang="en-US"/>
+          </a:p>
+        </p:txBody>
+      </p:sp>
+      <p:pic>
+        <p:nvPicPr>
+          <p:cNvPr id="13" name="Content Placeholder 12" descr="A picture containing cabinet, library&#10;&#10;Description automatically generated">
+            <a:extLst>
+              <a:ext uri="{FF2B5EF4-FFF2-40B4-BE49-F238E27FC236}">
+                <a16:creationId xmlns:a16="http://schemas.microsoft.com/office/drawing/2014/main" id="{D2A95880-0894-4B5D-BF56-C3DCD4A96963}"/>
+              </a:ext>
+            </a:extLst>
+          </p:cNvPr>
+          <p:cNvPicPr>
+            <a:picLocks noGrp="1" noChangeAspect="1"/>
+          </p:cNvPicPr>
+          <p:nvPr>
+            <p:ph idx="1"/>
+          </p:nvPr>
+        </p:nvPicPr>
+        <p:blipFill>
+          <a:blip r:embed="rId2">
+            <a:extLst>
+              <a:ext uri="{28A0092B-C50C-407E-A947-70E740481C1C}">
+                <a14:useLocalDpi xmlns:a14="http://schemas.microsoft.com/office/drawing/2010/main" val="0"/>
+              </a:ext>
+            </a:extLst>
+          </a:blip>
+          <a:stretch>
+            <a:fillRect/>
+          </a:stretch>
+        </p:blipFill>
+        <p:spPr>
+          <a:xfrm>
+            <a:off x="975922" y="640080"/>
+            <a:ext cx="5591820" cy="5577840"/>
+          </a:xfrm>
+          <a:prstGeom prst="rect">
+            <a:avLst/>
+          </a:prstGeom>
+        </p:spPr>
+      </p:pic>
+      <p:sp>
+        <p:nvSpPr>
+          <p:cNvPr id="33" name="Rectangle 32">
+            <a:extLst>
+              <a:ext uri="{FF2B5EF4-FFF2-40B4-BE49-F238E27FC236}">
+                <a16:creationId xmlns:a16="http://schemas.microsoft.com/office/drawing/2014/main" id="{984BBFDD-E720-4805-A9C8-129FBBF6DD70}"/>
+              </a:ext>
+              <a:ext uri="{C183D7F6-B498-43B3-948B-1728B52AA6E4}">
+                <adec:decorative xmlns:adec="http://schemas.microsoft.com/office/drawing/2017/decorative" val="1"/>
+              </a:ext>
+            </a:extLst>
+          </p:cNvPr>
+          <p:cNvSpPr>
+            <a:spLocks noGrp="1" noRot="1" noChangeAspect="1" noMove="1" noResize="1" noEditPoints="1" noAdjustHandles="1" noChangeArrowheads="1" noChangeShapeType="1" noTextEdit="1"/>
+          </p:cNvSpPr>
+          <p:nvPr>
+            <p:extLst>
+              <p:ext uri="{386F3935-93C4-4BCD-93E2-E3B085C9AB24}">
+                <p16:designElem xmlns:p16="http://schemas.microsoft.com/office/powerpoint/2015/main" val="1"/>
+              </p:ext>
+            </p:extLst>
+          </p:nvPr>
+        </p:nvSpPr>
+        <p:spPr bwMode="white">
+          <a:xfrm>
+            <a:off x="7613486" y="0"/>
+            <a:ext cx="4584734" cy="6858000"/>
+          </a:xfrm>
+          <a:prstGeom prst="rect">
+            <a:avLst/>
+          </a:prstGeom>
+          <a:solidFill>
+            <a:schemeClr val="accent2"/>
+          </a:solidFill>
+          <a:ln>
+            <a:noFill/>
+          </a:ln>
+        </p:spPr>
+        <p:style>
+          <a:lnRef idx="2">
+            <a:schemeClr val="accent1">
+              <a:shade val="50000"/>
+            </a:schemeClr>
+          </a:lnRef>
+          <a:fillRef idx="1">
+            <a:schemeClr val="accent1"/>
+          </a:fillRef>
+          <a:effectRef idx="0">
+            <a:schemeClr val="accent1"/>
+          </a:effectRef>
+          <a:fontRef idx="minor">
+            <a:schemeClr val="lt1"/>
+          </a:fontRef>
+        </p:style>
+      </p:sp>
+      <p:sp>
+        <p:nvSpPr>
           <p:cNvPr id="2" name="Title 1">
             <a:extLst>
               <a:ext uri="{FF2B5EF4-FFF2-40B4-BE49-F238E27FC236}">
-                <a16:creationId xmlns:a16="http://schemas.microsoft.com/office/drawing/2014/main" id="{C86331F0-668D-4D95-AB26-7EC6AF3D59F4}"/>
+                <a16:creationId xmlns:a16="http://schemas.microsoft.com/office/drawing/2014/main" id="{6D680BF3-2554-45AA-B6CE-75B86398315A}"/>
               </a:ext>
             </a:extLst>
           </p:cNvPr>
@@ -3936,50 +4287,88 @@
             <p:ph type="title"/>
           </p:nvPr>
         </p:nvSpPr>
-        <p:spPr/>
-        <p:txBody>
-          <a:bodyPr/>
+        <p:spPr>
+          <a:xfrm>
+            <a:off x="8096885" y="640080"/>
+            <a:ext cx="3659246" cy="2926080"/>
+          </a:xfrm>
+        </p:spPr>
+        <p:txBody>
+          <a:bodyPr vert="horz" lIns="91440" tIns="45720" rIns="91440" bIns="45720" rtlCol="0" anchor="b">
+            <a:normAutofit/>
+          </a:bodyPr>
           <a:lstStyle/>
           <a:p>
             <a:r>
-              <a:rPr lang="en-US" dirty="0"/>
-              <a:t>How to build the solution</a:t>
-            </a:r>
-          </a:p>
-        </p:txBody>
-      </p:sp>
-      <p:sp>
-        <p:nvSpPr>
-          <p:cNvPr id="3" name="Content Placeholder 2">
+              <a:rPr lang="en-US" sz="4400" dirty="0">
+                <a:solidFill>
+                  <a:srgbClr val="FFFFFF"/>
+                </a:solidFill>
+              </a:rPr>
+              <a:t>All Together</a:t>
+            </a:r>
+          </a:p>
+        </p:txBody>
+      </p:sp>
+      <p:sp>
+        <p:nvSpPr>
+          <p:cNvPr id="35" name="Rectangle 34">
             <a:extLst>
               <a:ext uri="{FF2B5EF4-FFF2-40B4-BE49-F238E27FC236}">
-                <a16:creationId xmlns:a16="http://schemas.microsoft.com/office/drawing/2014/main" id="{189FB87C-2C56-4A9A-98C3-F1C5A782A46F}"/>
+                <a16:creationId xmlns:a16="http://schemas.microsoft.com/office/drawing/2014/main" id="{5AC4BE46-4A77-42FE-9D15-065CDB2F847C}"/>
+              </a:ext>
+              <a:ext uri="{C183D7F6-B498-43B3-948B-1728B52AA6E4}">
+                <adec:decorative xmlns:adec="http://schemas.microsoft.com/office/drawing/2017/decorative" val="1"/>
               </a:ext>
             </a:extLst>
           </p:cNvPr>
           <p:cNvSpPr>
-            <a:spLocks noGrp="1"/>
-          </p:cNvSpPr>
-          <p:nvPr>
-            <p:ph idx="1"/>
-          </p:nvPr>
-        </p:nvSpPr>
-        <p:spPr/>
-        <p:txBody>
-          <a:bodyPr/>
-          <a:lstStyle/>
-          <a:p>
-            <a:r>
-              <a:rPr lang="en-US" dirty="0"/>
-              <a:t> - just open the index.html file</a:t>
-            </a:r>
-          </a:p>
-        </p:txBody>
+            <a:spLocks noGrp="1" noRot="1" noChangeAspect="1" noMove="1" noResize="1" noEditPoints="1" noAdjustHandles="1" noChangeArrowheads="1" noChangeShapeType="1" noTextEdit="1"/>
+          </p:cNvSpPr>
+          <p:nvPr>
+            <p:extLst>
+              <p:ext uri="{386F3935-93C4-4BCD-93E2-E3B085C9AB24}">
+                <p16:designElem xmlns:p16="http://schemas.microsoft.com/office/powerpoint/2015/main" val="1"/>
+              </p:ext>
+            </p:extLst>
+          </p:nvPr>
+        </p:nvSpPr>
+        <p:spPr>
+          <a:xfrm>
+            <a:off x="7556906" y="0"/>
+            <a:ext cx="64008" cy="6858000"/>
+          </a:xfrm>
+          <a:prstGeom prst="rect">
+            <a:avLst/>
+          </a:prstGeom>
+          <a:solidFill>
+            <a:schemeClr val="accent1"/>
+          </a:solidFill>
+          <a:ln>
+            <a:noFill/>
+          </a:ln>
+        </p:spPr>
+        <p:style>
+          <a:lnRef idx="2">
+            <a:schemeClr val="accent1">
+              <a:shade val="50000"/>
+            </a:schemeClr>
+          </a:lnRef>
+          <a:fillRef idx="1">
+            <a:schemeClr val="accent1"/>
+          </a:fillRef>
+          <a:effectRef idx="0">
+            <a:schemeClr val="accent1"/>
+          </a:effectRef>
+          <a:fontRef idx="minor">
+            <a:schemeClr val="lt1"/>
+          </a:fontRef>
+        </p:style>
       </p:sp>
     </p:spTree>
     <p:extLst>
       <p:ext uri="{BB962C8B-B14F-4D97-AF65-F5344CB8AC3E}">
-        <p14:creationId xmlns:p14="http://schemas.microsoft.com/office/powerpoint/2010/main" val="2626063655"/>
+        <p14:creationId xmlns:p14="http://schemas.microsoft.com/office/powerpoint/2010/main" val="2036783459"/>
       </p:ext>
     </p:extLst>
   </p:cSld>
@@ -4011,7 +4400,7 @@
           <p:cNvPr id="2" name="Title 1">
             <a:extLst>
               <a:ext uri="{FF2B5EF4-FFF2-40B4-BE49-F238E27FC236}">
-                <a16:creationId xmlns:a16="http://schemas.microsoft.com/office/drawing/2014/main" id="{1BCBE977-03F5-45CD-B4E7-891C19C3F947}"/>
+                <a16:creationId xmlns:a16="http://schemas.microsoft.com/office/drawing/2014/main" id="{D7DE535C-4172-4F58-8400-017D622E1C3E}"/>
               </a:ext>
             </a:extLst>
           </p:cNvPr>
@@ -4029,99 +4418,123 @@
           <a:p>
             <a:r>
               <a:rPr lang="en-US" dirty="0"/>
-              <a:t>How to run</a:t>
-            </a:r>
-          </a:p>
-        </p:txBody>
-      </p:sp>
-      <p:pic>
-        <p:nvPicPr>
-          <p:cNvPr id="5" name="Content Placeholder 4" descr="A screenshot of a social media post&#10;&#10;Description automatically generated">
+              <a:t>Libs/tools used</a:t>
+            </a:r>
+          </a:p>
+        </p:txBody>
+      </p:sp>
+      <p:sp>
+        <p:nvSpPr>
+          <p:cNvPr id="3" name="Content Placeholder 2">
             <a:extLst>
               <a:ext uri="{FF2B5EF4-FFF2-40B4-BE49-F238E27FC236}">
-                <a16:creationId xmlns:a16="http://schemas.microsoft.com/office/drawing/2014/main" id="{1037E60D-A8D9-4C21-BA12-0527ED910487}"/>
+                <a16:creationId xmlns:a16="http://schemas.microsoft.com/office/drawing/2014/main" id="{8B919E09-3994-42B5-9EEB-5988DDDB3BA2}"/>
               </a:ext>
             </a:extLst>
           </p:cNvPr>
-          <p:cNvPicPr>
-            <a:picLocks noGrp="1" noChangeAspect="1"/>
-          </p:cNvPicPr>
+          <p:cNvSpPr>
+            <a:spLocks noGrp="1"/>
+          </p:cNvSpPr>
           <p:nvPr>
             <p:ph idx="1"/>
           </p:nvPr>
-        </p:nvPicPr>
-        <p:blipFill rotWithShape="1">
-          <a:blip r:embed="rId2">
-            <a:extLst>
-              <a:ext uri="{28A0092B-C50C-407E-A947-70E740481C1C}">
-                <a14:useLocalDpi xmlns:a14="http://schemas.microsoft.com/office/drawing/2010/main" val="0"/>
-              </a:ext>
-            </a:extLst>
-          </a:blip>
-          <a:srcRect b="6991"/>
-          <a:stretch/>
-        </p:blipFill>
-        <p:spPr>
-          <a:xfrm>
-            <a:off x="2642263" y="1955411"/>
-            <a:ext cx="9549737" cy="4304714"/>
-          </a:xfrm>
-        </p:spPr>
-      </p:pic>
-      <p:sp>
-        <p:nvSpPr>
-          <p:cNvPr id="6" name="TextBox 5">
-            <a:extLst>
-              <a:ext uri="{FF2B5EF4-FFF2-40B4-BE49-F238E27FC236}">
-                <a16:creationId xmlns:a16="http://schemas.microsoft.com/office/drawing/2014/main" id="{790F4266-F828-445C-A1E9-AAEE5ADAEDB5}"/>
-              </a:ext>
-            </a:extLst>
-          </p:cNvPr>
-          <p:cNvSpPr txBox="1"/>
-          <p:nvPr/>
-        </p:nvSpPr>
-        <p:spPr>
-          <a:xfrm>
-            <a:off x="351693" y="2827605"/>
-            <a:ext cx="2107690" cy="1754326"/>
-          </a:xfrm>
-          <a:prstGeom prst="rect">
-            <a:avLst/>
-          </a:prstGeom>
-          <a:noFill/>
-        </p:spPr>
-        <p:txBody>
-          <a:bodyPr wrap="square" rtlCol="0">
-            <a:spAutoFit/>
-          </a:bodyPr>
+        </p:nvSpPr>
+        <p:spPr/>
+        <p:txBody>
+          <a:bodyPr/>
           <a:lstStyle/>
           <a:p>
             <a:r>
               <a:rPr lang="en-US" dirty="0"/>
-              <a:t>1- choose DEF file</a:t>
-            </a:r>
-          </a:p>
-          <a:p>
+              <a:t>- </a:t>
+            </a:r>
+            <a:r>
+              <a:rPr lang="en-US" dirty="0" err="1"/>
+              <a:t>svgZoomPan</a:t>
+            </a:r>
             <a:r>
               <a:rPr lang="en-US" dirty="0"/>
-              <a:t>2- Choose LEF file</a:t>
-            </a:r>
+              <a:t> </a:t>
+            </a:r>
+            <a:r>
+              <a:rPr lang="en-US" sz="1800" u="sng" dirty="0">
+                <a:solidFill>
+                  <a:srgbClr val="0070C0"/>
+                </a:solidFill>
+              </a:rPr>
+              <a:t>https://github.com/ariutta/svg-pan-zoom</a:t>
+            </a:r>
+            <a:endParaRPr lang="en-US" u="sng" dirty="0">
+              <a:solidFill>
+                <a:srgbClr val="0070C0"/>
+              </a:solidFill>
+            </a:endParaRPr>
           </a:p>
           <a:p>
             <a:r>
               <a:rPr lang="en-US" dirty="0"/>
-              <a:t>3- Press ‘VIEW IT’ to see the SVG layout</a:t>
-            </a:r>
-          </a:p>
-          <a:p>
+              <a:t>- </a:t>
+            </a:r>
+            <a:r>
+              <a:rPr lang="en-US" dirty="0" err="1"/>
+              <a:t>jquery</a:t>
+            </a:r>
             <a:r>
               <a:rPr lang="en-US" dirty="0"/>
-              <a:t>4- Export to download the .</a:t>
-            </a:r>
-            <a:r>
-              <a:rPr lang="en-US" dirty="0" err="1"/>
-              <a:t>svg</a:t>
-            </a:r>
+              <a:t>, JavaScript, HTML, CSS</a:t>
+            </a:r>
+          </a:p>
+          <a:p>
+            <a:r>
+              <a:rPr lang="en-US" dirty="0"/>
+              <a:t>- DEF and LEF </a:t>
+            </a:r>
+            <a:r>
+              <a:rPr lang="en-US" dirty="0">
+                <a:solidFill>
+                  <a:srgbClr val="0070C0"/>
+                </a:solidFill>
+              </a:rPr>
+              <a:t>parser </a:t>
+            </a:r>
+            <a:r>
+              <a:rPr lang="en-US" dirty="0">
+                <a:solidFill>
+                  <a:srgbClr val="0070C0"/>
+                </a:solidFill>
+                <a:hlinkClick r:id="rId2"/>
+              </a:rPr>
+              <a:t>https://github.com/claude-abounegm/DEF-Viewer/tree/master/DEFViewer/Scripts/Custom</a:t>
+            </a:r>
+            <a:endParaRPr lang="en-US" dirty="0">
+              <a:solidFill>
+                <a:srgbClr val="0070C0"/>
+              </a:solidFill>
+            </a:endParaRPr>
+          </a:p>
+          <a:p>
+            <a:r>
+              <a:rPr lang="en-US" dirty="0">
+                <a:solidFill>
+                  <a:srgbClr val="0070C0"/>
+                </a:solidFill>
+              </a:rPr>
+              <a:t>- </a:t>
+            </a:r>
+            <a:r>
+              <a:rPr lang="en-US" dirty="0"/>
+              <a:t>Bootstrap</a:t>
+            </a:r>
+            <a:r>
+              <a:rPr lang="en-US" dirty="0">
+                <a:solidFill>
+                  <a:srgbClr val="0070C0"/>
+                </a:solidFill>
+              </a:rPr>
+              <a:t> </a:t>
+            </a:r>
+          </a:p>
+          <a:p>
             <a:endParaRPr lang="en-US" dirty="0"/>
           </a:p>
         </p:txBody>
@@ -4129,7 +4542,7 @@
     </p:spTree>
     <p:extLst>
       <p:ext uri="{BB962C8B-B14F-4D97-AF65-F5344CB8AC3E}">
-        <p14:creationId xmlns:p14="http://schemas.microsoft.com/office/powerpoint/2010/main" val="1063717974"/>
+        <p14:creationId xmlns:p14="http://schemas.microsoft.com/office/powerpoint/2010/main" val="1259450079"/>
       </p:ext>
     </p:extLst>
   </p:cSld>
@@ -4161,7 +4574,7 @@
           <p:cNvPr id="2" name="Title 1">
             <a:extLst>
               <a:ext uri="{FF2B5EF4-FFF2-40B4-BE49-F238E27FC236}">
-                <a16:creationId xmlns:a16="http://schemas.microsoft.com/office/drawing/2014/main" id="{6CD74636-685C-4B57-88F9-A158164FFD12}"/>
+                <a16:creationId xmlns:a16="http://schemas.microsoft.com/office/drawing/2014/main" id="{CDD7B6F3-0412-43F5-8147-6E76FD7F6D1F}"/>
               </a:ext>
             </a:extLst>
           </p:cNvPr>
@@ -4172,10 +4585,192 @@
             <p:ph type="title"/>
           </p:nvPr>
         </p:nvSpPr>
-        <p:spPr>
-          <a:xfrm>
-            <a:off x="5088987" y="3052689"/>
-            <a:ext cx="2014025" cy="752621"/>
+        <p:spPr/>
+        <p:txBody>
+          <a:bodyPr/>
+          <a:lstStyle/>
+          <a:p>
+            <a:r>
+              <a:rPr lang="en-US" dirty="0"/>
+              <a:t>Design issues</a:t>
+            </a:r>
+          </a:p>
+        </p:txBody>
+      </p:sp>
+      <p:sp>
+        <p:nvSpPr>
+          <p:cNvPr id="3" name="Content Placeholder 2">
+            <a:extLst>
+              <a:ext uri="{FF2B5EF4-FFF2-40B4-BE49-F238E27FC236}">
+                <a16:creationId xmlns:a16="http://schemas.microsoft.com/office/drawing/2014/main" id="{5B01A2C6-6121-4F50-9752-15152EDF3899}"/>
+              </a:ext>
+            </a:extLst>
+          </p:cNvPr>
+          <p:cNvSpPr>
+            <a:spLocks noGrp="1"/>
+          </p:cNvSpPr>
+          <p:nvPr>
+            <p:ph idx="1"/>
+          </p:nvPr>
+        </p:nvSpPr>
+        <p:spPr>
+          <a:xfrm>
+            <a:off x="1097280" y="2366239"/>
+            <a:ext cx="10058400" cy="4023360"/>
+          </a:xfrm>
+        </p:spPr>
+        <p:txBody>
+          <a:bodyPr/>
+          <a:lstStyle/>
+          <a:p>
+            <a:r>
+              <a:rPr lang="en-US" dirty="0"/>
+              <a:t>- Some of the features might not be supported on older browsers.</a:t>
+            </a:r>
+          </a:p>
+        </p:txBody>
+      </p:sp>
+    </p:spTree>
+    <p:extLst>
+      <p:ext uri="{BB962C8B-B14F-4D97-AF65-F5344CB8AC3E}">
+        <p14:creationId xmlns:p14="http://schemas.microsoft.com/office/powerpoint/2010/main" val="1077328594"/>
+      </p:ext>
+    </p:extLst>
+  </p:cSld>
+  <p:clrMapOvr>
+    <a:masterClrMapping/>
+  </p:clrMapOvr>
+</p:sld>
+</file>
+
+<file path=ppt/slides/slide13.xml><?xml version="1.0" encoding="utf-8"?>
+<p:sld xmlns:a="http://schemas.openxmlformats.org/drawingml/2006/main" xmlns:r="http://schemas.openxmlformats.org/officeDocument/2006/relationships" xmlns:p="http://schemas.openxmlformats.org/presentationml/2006/main">
+  <p:cSld>
+    <p:spTree>
+      <p:nvGrpSpPr>
+        <p:cNvPr id="1" name=""/>
+        <p:cNvGrpSpPr/>
+        <p:nvPr/>
+      </p:nvGrpSpPr>
+      <p:grpSpPr>
+        <a:xfrm>
+          <a:off x="0" y="0"/>
+          <a:ext cx="0" cy="0"/>
+          <a:chOff x="0" y="0"/>
+          <a:chExt cx="0" cy="0"/>
+        </a:xfrm>
+      </p:grpSpPr>
+      <p:sp>
+        <p:nvSpPr>
+          <p:cNvPr id="2" name="Title 1">
+            <a:extLst>
+              <a:ext uri="{FF2B5EF4-FFF2-40B4-BE49-F238E27FC236}">
+                <a16:creationId xmlns:a16="http://schemas.microsoft.com/office/drawing/2014/main" id="{C86331F0-668D-4D95-AB26-7EC6AF3D59F4}"/>
+              </a:ext>
+            </a:extLst>
+          </p:cNvPr>
+          <p:cNvSpPr>
+            <a:spLocks noGrp="1"/>
+          </p:cNvSpPr>
+          <p:nvPr>
+            <p:ph type="title"/>
+          </p:nvPr>
+        </p:nvSpPr>
+        <p:spPr/>
+        <p:txBody>
+          <a:bodyPr/>
+          <a:lstStyle/>
+          <a:p>
+            <a:r>
+              <a:rPr lang="en-US" dirty="0"/>
+              <a:t>How to build the solution</a:t>
+            </a:r>
+          </a:p>
+        </p:txBody>
+      </p:sp>
+      <p:sp>
+        <p:nvSpPr>
+          <p:cNvPr id="3" name="Content Placeholder 2">
+            <a:extLst>
+              <a:ext uri="{FF2B5EF4-FFF2-40B4-BE49-F238E27FC236}">
+                <a16:creationId xmlns:a16="http://schemas.microsoft.com/office/drawing/2014/main" id="{189FB87C-2C56-4A9A-98C3-F1C5A782A46F}"/>
+              </a:ext>
+            </a:extLst>
+          </p:cNvPr>
+          <p:cNvSpPr>
+            <a:spLocks noGrp="1"/>
+          </p:cNvSpPr>
+          <p:nvPr>
+            <p:ph idx="1"/>
+          </p:nvPr>
+        </p:nvSpPr>
+        <p:spPr>
+          <a:xfrm>
+            <a:off x="1097280" y="2380306"/>
+            <a:ext cx="10058400" cy="4023360"/>
+          </a:xfrm>
+        </p:spPr>
+        <p:txBody>
+          <a:bodyPr/>
+          <a:lstStyle/>
+          <a:p>
+            <a:r>
+              <a:rPr lang="en-US" dirty="0"/>
+              <a:t> - just open the index.html file</a:t>
+            </a:r>
+          </a:p>
+        </p:txBody>
+      </p:sp>
+    </p:spTree>
+    <p:extLst>
+      <p:ext uri="{BB962C8B-B14F-4D97-AF65-F5344CB8AC3E}">
+        <p14:creationId xmlns:p14="http://schemas.microsoft.com/office/powerpoint/2010/main" val="2626063655"/>
+      </p:ext>
+    </p:extLst>
+  </p:cSld>
+  <p:clrMapOvr>
+    <a:masterClrMapping/>
+  </p:clrMapOvr>
+</p:sld>
+</file>
+
+<file path=ppt/slides/slide14.xml><?xml version="1.0" encoding="utf-8"?>
+<p:sld xmlns:a="http://schemas.openxmlformats.org/drawingml/2006/main" xmlns:r="http://schemas.openxmlformats.org/officeDocument/2006/relationships" xmlns:p="http://schemas.openxmlformats.org/presentationml/2006/main">
+  <p:cSld>
+    <p:spTree>
+      <p:nvGrpSpPr>
+        <p:cNvPr id="1" name=""/>
+        <p:cNvGrpSpPr/>
+        <p:nvPr/>
+      </p:nvGrpSpPr>
+      <p:grpSpPr>
+        <a:xfrm>
+          <a:off x="0" y="0"/>
+          <a:ext cx="0" cy="0"/>
+          <a:chOff x="0" y="0"/>
+          <a:chExt cx="0" cy="0"/>
+        </a:xfrm>
+      </p:grpSpPr>
+      <p:sp>
+        <p:nvSpPr>
+          <p:cNvPr id="2" name="Title 1">
+            <a:extLst>
+              <a:ext uri="{FF2B5EF4-FFF2-40B4-BE49-F238E27FC236}">
+                <a16:creationId xmlns:a16="http://schemas.microsoft.com/office/drawing/2014/main" id="{6CD74636-685C-4B57-88F9-A158164FFD12}"/>
+              </a:ext>
+            </a:extLst>
+          </p:cNvPr>
+          <p:cNvSpPr>
+            <a:spLocks noGrp="1"/>
+          </p:cNvSpPr>
+          <p:nvPr>
+            <p:ph type="title"/>
+          </p:nvPr>
+        </p:nvSpPr>
+        <p:spPr>
+          <a:xfrm>
+            <a:off x="4458576" y="3052689"/>
+            <a:ext cx="3274844" cy="752621"/>
           </a:xfrm>
         </p:spPr>
         <p:txBody>
@@ -4186,8 +4781,46 @@
           <a:p>
             <a:r>
               <a:rPr lang="en-US" sz="5400" dirty="0"/>
-              <a:t>DEMO</a:t>
-            </a:r>
+              <a:t>LIVE DEMO</a:t>
+            </a:r>
+          </a:p>
+        </p:txBody>
+      </p:sp>
+      <p:sp>
+        <p:nvSpPr>
+          <p:cNvPr id="3" name="TextBox 2">
+            <a:extLst>
+              <a:ext uri="{FF2B5EF4-FFF2-40B4-BE49-F238E27FC236}">
+                <a16:creationId xmlns:a16="http://schemas.microsoft.com/office/drawing/2014/main" id="{CE44330A-7A79-47ED-8D77-B8382626A5B3}"/>
+              </a:ext>
+            </a:extLst>
+          </p:cNvPr>
+          <p:cNvSpPr txBox="1"/>
+          <p:nvPr/>
+        </p:nvSpPr>
+        <p:spPr>
+          <a:xfrm>
+            <a:off x="4196860" y="3938953"/>
+            <a:ext cx="3798277" cy="369332"/>
+          </a:xfrm>
+          <a:prstGeom prst="rect">
+            <a:avLst/>
+          </a:prstGeom>
+          <a:noFill/>
+        </p:spPr>
+        <p:txBody>
+          <a:bodyPr wrap="square" rtlCol="0">
+            <a:spAutoFit/>
+          </a:bodyPr>
+          <a:lstStyle/>
+          <a:p>
+            <a:r>
+              <a:rPr lang="en-US" dirty="0">
+                <a:hlinkClick r:id="rId2"/>
+              </a:rPr>
+              <a:t>https://def2svg.000webhostapp.com/</a:t>
+            </a:r>
+            <a:endParaRPr lang="en-US" dirty="0"/>
           </a:p>
         </p:txBody>
       </p:sp>
@@ -4204,7 +4837,305 @@
 </p:sld>
 </file>
 
-<file path=ppt/slides/slide13.xml><?xml version="1.0" encoding="utf-8"?>
+<file path=ppt/slides/slide15.xml><?xml version="1.0" encoding="utf-8"?>
+<p:sld xmlns:a="http://schemas.openxmlformats.org/drawingml/2006/main" xmlns:r="http://schemas.openxmlformats.org/officeDocument/2006/relationships" xmlns:p="http://schemas.openxmlformats.org/presentationml/2006/main">
+  <p:cSld>
+    <p:spTree>
+      <p:nvGrpSpPr>
+        <p:cNvPr id="1" name=""/>
+        <p:cNvGrpSpPr/>
+        <p:nvPr/>
+      </p:nvGrpSpPr>
+      <p:grpSpPr>
+        <a:xfrm>
+          <a:off x="0" y="0"/>
+          <a:ext cx="0" cy="0"/>
+          <a:chOff x="0" y="0"/>
+          <a:chExt cx="0" cy="0"/>
+        </a:xfrm>
+      </p:grpSpPr>
+      <p:sp>
+        <p:nvSpPr>
+          <p:cNvPr id="2" name="Title 1">
+            <a:extLst>
+              <a:ext uri="{FF2B5EF4-FFF2-40B4-BE49-F238E27FC236}">
+                <a16:creationId xmlns:a16="http://schemas.microsoft.com/office/drawing/2014/main" id="{69E0F0BF-EB1D-436D-8E4B-AF116BDB98C5}"/>
+              </a:ext>
+            </a:extLst>
+          </p:cNvPr>
+          <p:cNvSpPr>
+            <a:spLocks noGrp="1"/>
+          </p:cNvSpPr>
+          <p:nvPr>
+            <p:ph type="title"/>
+          </p:nvPr>
+        </p:nvSpPr>
+        <p:spPr/>
+        <p:txBody>
+          <a:bodyPr/>
+          <a:lstStyle/>
+          <a:p>
+            <a:r>
+              <a:rPr lang="en-US" dirty="0"/>
+              <a:t>Remaining work</a:t>
+            </a:r>
+          </a:p>
+        </p:txBody>
+      </p:sp>
+      <p:sp>
+        <p:nvSpPr>
+          <p:cNvPr id="3" name="Content Placeholder 2">
+            <a:extLst>
+              <a:ext uri="{FF2B5EF4-FFF2-40B4-BE49-F238E27FC236}">
+                <a16:creationId xmlns:a16="http://schemas.microsoft.com/office/drawing/2014/main" id="{B415E156-9A5A-4A13-B1EB-6EB63EBF86DC}"/>
+              </a:ext>
+            </a:extLst>
+          </p:cNvPr>
+          <p:cNvSpPr>
+            <a:spLocks noGrp="1"/>
+          </p:cNvSpPr>
+          <p:nvPr>
+            <p:ph idx="1"/>
+          </p:nvPr>
+        </p:nvSpPr>
+        <p:spPr>
+          <a:xfrm>
+            <a:off x="1097280" y="2352171"/>
+            <a:ext cx="10058400" cy="4023360"/>
+          </a:xfrm>
+        </p:spPr>
+        <p:txBody>
+          <a:bodyPr/>
+          <a:lstStyle/>
+          <a:p>
+            <a:r>
+              <a:rPr lang="en-US" dirty="0"/>
+              <a:t>-  Graphically showing the DRC errors</a:t>
+            </a:r>
+          </a:p>
+        </p:txBody>
+      </p:sp>
+    </p:spTree>
+    <p:extLst>
+      <p:ext uri="{BB962C8B-B14F-4D97-AF65-F5344CB8AC3E}">
+        <p14:creationId xmlns:p14="http://schemas.microsoft.com/office/powerpoint/2010/main" val="635951925"/>
+      </p:ext>
+    </p:extLst>
+  </p:cSld>
+  <p:clrMapOvr>
+    <a:masterClrMapping/>
+  </p:clrMapOvr>
+</p:sld>
+</file>
+
+<file path=ppt/slides/slide16.xml><?xml version="1.0" encoding="utf-8"?>
+<p:sld xmlns:a="http://schemas.openxmlformats.org/drawingml/2006/main" xmlns:r="http://schemas.openxmlformats.org/officeDocument/2006/relationships" xmlns:p="http://schemas.openxmlformats.org/presentationml/2006/main">
+  <p:cSld>
+    <p:spTree>
+      <p:nvGrpSpPr>
+        <p:cNvPr id="1" name=""/>
+        <p:cNvGrpSpPr/>
+        <p:nvPr/>
+      </p:nvGrpSpPr>
+      <p:grpSpPr>
+        <a:xfrm>
+          <a:off x="0" y="0"/>
+          <a:ext cx="0" cy="0"/>
+          <a:chOff x="0" y="0"/>
+          <a:chExt cx="0" cy="0"/>
+        </a:xfrm>
+      </p:grpSpPr>
+      <p:sp>
+        <p:nvSpPr>
+          <p:cNvPr id="2" name="Title 1">
+            <a:extLst>
+              <a:ext uri="{FF2B5EF4-FFF2-40B4-BE49-F238E27FC236}">
+                <a16:creationId xmlns:a16="http://schemas.microsoft.com/office/drawing/2014/main" id="{29F42601-FED4-4CD3-93B2-3A6946B6E961}"/>
+              </a:ext>
+            </a:extLst>
+          </p:cNvPr>
+          <p:cNvSpPr>
+            <a:spLocks noGrp="1"/>
+          </p:cNvSpPr>
+          <p:nvPr>
+            <p:ph type="title"/>
+          </p:nvPr>
+        </p:nvSpPr>
+        <p:spPr/>
+        <p:txBody>
+          <a:bodyPr/>
+          <a:lstStyle/>
+          <a:p>
+            <a:r>
+              <a:rPr lang="en-US" dirty="0"/>
+              <a:t>Who did what?</a:t>
+            </a:r>
+          </a:p>
+        </p:txBody>
+      </p:sp>
+      <p:sp>
+        <p:nvSpPr>
+          <p:cNvPr id="3" name="Content Placeholder 2">
+            <a:extLst>
+              <a:ext uri="{FF2B5EF4-FFF2-40B4-BE49-F238E27FC236}">
+                <a16:creationId xmlns:a16="http://schemas.microsoft.com/office/drawing/2014/main" id="{A8555114-12FF-42BF-A279-E5A3EAF6F63E}"/>
+              </a:ext>
+            </a:extLst>
+          </p:cNvPr>
+          <p:cNvSpPr>
+            <a:spLocks noGrp="1"/>
+          </p:cNvSpPr>
+          <p:nvPr>
+            <p:ph idx="1"/>
+          </p:nvPr>
+        </p:nvSpPr>
+        <p:spPr/>
+        <p:txBody>
+          <a:bodyPr>
+            <a:normAutofit fontScale="70000" lnSpcReduction="20000"/>
+          </a:bodyPr>
+          <a:lstStyle/>
+          <a:p>
+            <a:r>
+              <a:rPr lang="en-US" dirty="0"/>
+              <a:t>- Ahmed Sharaf-</a:t>
+            </a:r>
+            <a:r>
+              <a:rPr lang="en-US" dirty="0" err="1"/>
+              <a:t>Eldein</a:t>
+            </a:r>
+            <a:endParaRPr lang="en-US" dirty="0"/>
+          </a:p>
+          <a:p>
+            <a:pPr lvl="1"/>
+            <a:r>
+              <a:rPr lang="en-US" dirty="0"/>
+              <a:t>Programing interface for SVG drawing.</a:t>
+            </a:r>
+          </a:p>
+          <a:p>
+            <a:pPr lvl="1"/>
+            <a:r>
+              <a:rPr lang="en-US" dirty="0"/>
+              <a:t>Exporting to SVG file format.</a:t>
+            </a:r>
+          </a:p>
+          <a:p>
+            <a:pPr lvl="1"/>
+            <a:r>
+              <a:rPr lang="en-US" dirty="0"/>
+              <a:t>SVG layering.</a:t>
+            </a:r>
+          </a:p>
+          <a:p>
+            <a:r>
+              <a:rPr lang="en-US" dirty="0"/>
+              <a:t>- </a:t>
+            </a:r>
+            <a:r>
+              <a:rPr lang="en-US" dirty="0" err="1"/>
+              <a:t>Alaa</a:t>
+            </a:r>
+            <a:r>
+              <a:rPr lang="en-US" dirty="0"/>
+              <a:t> Mohamed </a:t>
+            </a:r>
+          </a:p>
+          <a:p>
+            <a:pPr lvl="1"/>
+            <a:r>
+              <a:rPr lang="en-US" dirty="0"/>
+              <a:t>Finding DRC errors.</a:t>
+            </a:r>
+          </a:p>
+          <a:p>
+            <a:pPr lvl="1"/>
+            <a:r>
+              <a:rPr lang="en-US" dirty="0"/>
+              <a:t>Graphically highlighting DRC errors in the layout.</a:t>
+            </a:r>
+          </a:p>
+          <a:p>
+            <a:pPr lvl="1"/>
+            <a:r>
+              <a:rPr lang="en-US" dirty="0"/>
+              <a:t>Adding Feedback alerts</a:t>
+            </a:r>
+          </a:p>
+          <a:p>
+            <a:r>
+              <a:rPr lang="en-US" dirty="0"/>
+              <a:t>- Ahmed Marzouk</a:t>
+            </a:r>
+          </a:p>
+          <a:p>
+            <a:pPr lvl="1"/>
+            <a:r>
+              <a:rPr lang="en-US" dirty="0"/>
+              <a:t>Drawing and scaling the layout.</a:t>
+            </a:r>
+          </a:p>
+          <a:p>
+            <a:pPr lvl="1"/>
+            <a:r>
+              <a:rPr lang="en-US" dirty="0"/>
+              <a:t>Adding the hover effect.</a:t>
+            </a:r>
+          </a:p>
+          <a:p>
+            <a:pPr lvl="1"/>
+            <a:r>
+              <a:rPr lang="en-US" dirty="0"/>
+              <a:t>Adding the search feature.</a:t>
+            </a:r>
+          </a:p>
+          <a:p>
+            <a:r>
+              <a:rPr lang="en-US" dirty="0"/>
+              <a:t>- Ahmed Fayed</a:t>
+            </a:r>
+          </a:p>
+          <a:p>
+            <a:pPr lvl="1"/>
+            <a:r>
+              <a:rPr lang="en-US" dirty="0"/>
+              <a:t>Integrating all the new features together.</a:t>
+            </a:r>
+          </a:p>
+          <a:p>
+            <a:pPr lvl="1"/>
+            <a:r>
+              <a:rPr lang="en-US" dirty="0"/>
+              <a:t>Testing Everything.</a:t>
+            </a:r>
+          </a:p>
+          <a:p>
+            <a:pPr lvl="1"/>
+            <a:r>
+              <a:rPr lang="en-US" dirty="0"/>
+              <a:t>User interface design.</a:t>
+            </a:r>
+          </a:p>
+          <a:p>
+            <a:pPr lvl="1"/>
+            <a:endParaRPr lang="en-US" dirty="0"/>
+          </a:p>
+        </p:txBody>
+      </p:sp>
+    </p:spTree>
+    <p:extLst>
+      <p:ext uri="{BB962C8B-B14F-4D97-AF65-F5344CB8AC3E}">
+        <p14:creationId xmlns:p14="http://schemas.microsoft.com/office/powerpoint/2010/main" val="1454389322"/>
+      </p:ext>
+    </p:extLst>
+  </p:cSld>
+  <p:clrMapOvr>
+    <a:masterClrMapping/>
+  </p:clrMapOvr>
+</p:sld>
+</file>
+
+<file path=ppt/slides/slide17.xml><?xml version="1.0" encoding="utf-8"?>
 <p:sld xmlns:a="http://schemas.openxmlformats.org/drawingml/2006/main" xmlns:r="http://schemas.openxmlformats.org/officeDocument/2006/relationships" xmlns:p="http://schemas.openxmlformats.org/presentationml/2006/main">
   <p:cSld>
     <p:bg>
@@ -4680,14 +5611,25 @@
             <p:ph idx="1"/>
           </p:nvPr>
         </p:nvSpPr>
-        <p:spPr/>
+        <p:spPr>
+          <a:xfrm>
+            <a:off x="1097280" y="2295900"/>
+            <a:ext cx="10058400" cy="4023360"/>
+          </a:xfrm>
+        </p:spPr>
         <p:txBody>
           <a:bodyPr/>
           <a:lstStyle/>
           <a:p>
             <a:r>
               <a:rPr lang="en-US" dirty="0"/>
-              <a:t>- Convert a routed design in DEF and LEF to a layout in SVG</a:t>
+              <a:t>- Convert a routed design in DEF and LEF to a layout in SVG.</a:t>
+            </a:r>
+          </a:p>
+          <a:p>
+            <a:r>
+              <a:rPr lang="en-US" dirty="0"/>
+              <a:t>- Make it web-based.</a:t>
             </a:r>
           </a:p>
         </p:txBody>
@@ -4727,7 +5669,7 @@
           <p:cNvPr id="2" name="Title 1">
             <a:extLst>
               <a:ext uri="{FF2B5EF4-FFF2-40B4-BE49-F238E27FC236}">
-                <a16:creationId xmlns:a16="http://schemas.microsoft.com/office/drawing/2014/main" id="{7A649165-87B4-40DA-8525-6210247F6D0A}"/>
+                <a16:creationId xmlns:a16="http://schemas.microsoft.com/office/drawing/2014/main" id="{D51BA3D3-7216-4834-B163-BD291D62D24E}"/>
               </a:ext>
             </a:extLst>
           </p:cNvPr>
@@ -4745,17 +5687,17 @@
           <a:p>
             <a:r>
               <a:rPr lang="en-US" dirty="0"/>
-              <a:t>Solution</a:t>
-            </a:r>
-          </a:p>
-        </p:txBody>
-      </p:sp>
-      <p:sp>
-        <p:nvSpPr>
-          <p:cNvPr id="3" name="Content Placeholder 2">
+              <a:t>File Formats</a:t>
+            </a:r>
+          </a:p>
+        </p:txBody>
+      </p:sp>
+      <p:sp>
+        <p:nvSpPr>
+          <p:cNvPr id="5" name="Content Placeholder 4">
             <a:extLst>
               <a:ext uri="{FF2B5EF4-FFF2-40B4-BE49-F238E27FC236}">
-                <a16:creationId xmlns:a16="http://schemas.microsoft.com/office/drawing/2014/main" id="{23022041-9E56-4BFC-8261-35D319BE8B16}"/>
+                <a16:creationId xmlns:a16="http://schemas.microsoft.com/office/drawing/2014/main" id="{C38BB219-AC70-459C-A1DB-84DC91181081}"/>
               </a:ext>
             </a:extLst>
           </p:cNvPr>
@@ -4766,41 +5708,51 @@
             <p:ph idx="1"/>
           </p:nvPr>
         </p:nvSpPr>
-        <p:spPr/>
-        <p:txBody>
-          <a:bodyPr/>
+        <p:spPr>
+          <a:xfrm>
+            <a:off x="1097280" y="2014547"/>
+            <a:ext cx="10058400" cy="4023360"/>
+          </a:xfrm>
+        </p:spPr>
+        <p:txBody>
+          <a:bodyPr>
+            <a:normAutofit/>
+          </a:bodyPr>
           <a:lstStyle/>
           <a:p>
             <a:r>
-              <a:rPr lang="en-US" dirty="0"/>
-              <a:t> - Parsing the DEF and LEF files.</a:t>
-            </a:r>
-          </a:p>
-          <a:p>
-            <a:r>
-              <a:rPr lang="en-US" dirty="0"/>
-              <a:t>- Iterate through the DEF and, using SVG library, draw:</a:t>
-            </a:r>
-          </a:p>
-          <a:p>
-            <a:pPr lvl="3"/>
-            <a:r>
-              <a:rPr lang="en-US" sz="2000" dirty="0"/>
-              <a:t>*	Every cell given the dimensions stated in the LEF file.</a:t>
-            </a:r>
-          </a:p>
-          <a:p>
-            <a:pPr lvl="3"/>
-            <a:r>
-              <a:rPr lang="en-US" sz="2000" dirty="0"/>
-              <a:t>* The pins. </a:t>
-            </a:r>
-          </a:p>
-          <a:p>
-            <a:pPr lvl="3"/>
-            <a:r>
-              <a:rPr lang="en-US" sz="2000" dirty="0"/>
-              <a:t>* The nets. </a:t>
+              <a:rPr lang="en-US" sz="2800" dirty="0"/>
+              <a:t>Input files:</a:t>
+            </a:r>
+          </a:p>
+          <a:p>
+            <a:pPr lvl="1"/>
+            <a:r>
+              <a:rPr lang="en-US" sz="2800" dirty="0"/>
+              <a:t> DEF file</a:t>
+            </a:r>
+          </a:p>
+          <a:p>
+            <a:pPr lvl="1"/>
+            <a:r>
+              <a:rPr lang="en-US" sz="2800" dirty="0"/>
+              <a:t> LEF file</a:t>
+            </a:r>
+          </a:p>
+          <a:p>
+            <a:pPr marL="201168" lvl="1" indent="0">
+              <a:buNone/>
+            </a:pPr>
+            <a:r>
+              <a:rPr lang="en-US" sz="2800" dirty="0"/>
+              <a:t>Output file:</a:t>
+            </a:r>
+          </a:p>
+          <a:p>
+            <a:pPr lvl="1"/>
+            <a:r>
+              <a:rPr lang="en-US" sz="2800" dirty="0"/>
+              <a:t>SVG file</a:t>
             </a:r>
           </a:p>
         </p:txBody>
@@ -4808,7 +5760,7 @@
     </p:spTree>
     <p:extLst>
       <p:ext uri="{BB962C8B-B14F-4D97-AF65-F5344CB8AC3E}">
-        <p14:creationId xmlns:p14="http://schemas.microsoft.com/office/powerpoint/2010/main" val="2603679968"/>
+        <p14:creationId xmlns:p14="http://schemas.microsoft.com/office/powerpoint/2010/main" val="3852813538"/>
       </p:ext>
     </p:extLst>
   </p:cSld>
@@ -4840,7 +5792,7 @@
           <p:cNvPr id="2" name="Title 1">
             <a:extLst>
               <a:ext uri="{FF2B5EF4-FFF2-40B4-BE49-F238E27FC236}">
-                <a16:creationId xmlns:a16="http://schemas.microsoft.com/office/drawing/2014/main" id="{3EFA21AD-DC79-4941-891C-0AB848BABA50}"/>
+                <a16:creationId xmlns:a16="http://schemas.microsoft.com/office/drawing/2014/main" id="{7A649165-87B4-40DA-8525-6210247F6D0A}"/>
               </a:ext>
             </a:extLst>
           </p:cNvPr>
@@ -4858,50 +5810,70 @@
           <a:p>
             <a:r>
               <a:rPr lang="en-US" dirty="0"/>
-              <a:t>Parsing the DEF and LEF files.</a:t>
-            </a:r>
-          </a:p>
-        </p:txBody>
-      </p:sp>
-      <p:pic>
-        <p:nvPicPr>
-          <p:cNvPr id="5" name="Content Placeholder 4" descr="A screenshot of a cell phone&#10;&#10;Description automatically generated">
+              <a:t>Solution</a:t>
+            </a:r>
+          </a:p>
+        </p:txBody>
+      </p:sp>
+      <p:sp>
+        <p:nvSpPr>
+          <p:cNvPr id="3" name="Content Placeholder 2">
             <a:extLst>
               <a:ext uri="{FF2B5EF4-FFF2-40B4-BE49-F238E27FC236}">
-                <a16:creationId xmlns:a16="http://schemas.microsoft.com/office/drawing/2014/main" id="{65BFA94D-2620-48F5-8999-4D47BB3FE20D}"/>
+                <a16:creationId xmlns:a16="http://schemas.microsoft.com/office/drawing/2014/main" id="{23022041-9E56-4BFC-8261-35D319BE8B16}"/>
               </a:ext>
             </a:extLst>
           </p:cNvPr>
-          <p:cNvPicPr>
-            <a:picLocks noGrp="1" noChangeAspect="1"/>
-          </p:cNvPicPr>
+          <p:cNvSpPr>
+            <a:spLocks noGrp="1"/>
+          </p:cNvSpPr>
           <p:nvPr>
             <p:ph idx="1"/>
           </p:nvPr>
-        </p:nvPicPr>
-        <p:blipFill>
-          <a:blip r:embed="rId2">
-            <a:extLst>
-              <a:ext uri="{28A0092B-C50C-407E-A947-70E740481C1C}">
-                <a14:useLocalDpi xmlns:a14="http://schemas.microsoft.com/office/drawing/2010/main" val="0"/>
-              </a:ext>
-            </a:extLst>
-          </a:blip>
-          <a:stretch>
-            <a:fillRect/>
-          </a:stretch>
-        </p:blipFill>
-        <p:spPr>
-          <a:xfrm>
-            <a:off x="1265444" y="2053882"/>
-            <a:ext cx="9205852" cy="3812345"/>
-          </a:xfrm>
-        </p:spPr>
-      </p:pic>
+        </p:nvSpPr>
+        <p:spPr/>
+        <p:txBody>
+          <a:bodyPr/>
+          <a:lstStyle/>
+          <a:p>
+            <a:r>
+              <a:rPr lang="en-US" dirty="0"/>
+              <a:t>- Parse the DEF and LEF files.</a:t>
+            </a:r>
+          </a:p>
+          <a:p>
+            <a:r>
+              <a:rPr lang="en-US" dirty="0"/>
+              <a:t>- Iterate through the parsed DEF object and, using SVG library and the parsed LEF, draw:</a:t>
+            </a:r>
+          </a:p>
+          <a:p>
+            <a:pPr lvl="3"/>
+            <a:r>
+              <a:rPr lang="en-US" sz="2000" dirty="0"/>
+              <a:t>Every cell given the dimensions stated in the LEF file and the locations stated on the .def 	file.</a:t>
+            </a:r>
+          </a:p>
+          <a:p>
+            <a:pPr lvl="3"/>
+            <a:r>
+              <a:rPr lang="en-US" sz="2000" dirty="0"/>
+              <a:t>The pins. </a:t>
+            </a:r>
+          </a:p>
+          <a:p>
+            <a:pPr lvl="3"/>
+            <a:r>
+              <a:rPr lang="en-US" sz="2000" dirty="0"/>
+              <a:t>The nets. </a:t>
+            </a:r>
+          </a:p>
+        </p:txBody>
+      </p:sp>
     </p:spTree>
     <p:extLst>
       <p:ext uri="{BB962C8B-B14F-4D97-AF65-F5344CB8AC3E}">
-        <p14:creationId xmlns:p14="http://schemas.microsoft.com/office/powerpoint/2010/main" val="1010133248"/>
+        <p14:creationId xmlns:p14="http://schemas.microsoft.com/office/powerpoint/2010/main" val="2603679968"/>
       </p:ext>
     </p:extLst>
   </p:cSld>
@@ -4914,14 +5886,6 @@
 <file path=ppt/slides/slide5.xml><?xml version="1.0" encoding="utf-8"?>
 <p:sld xmlns:a="http://schemas.openxmlformats.org/drawingml/2006/main" xmlns:r="http://schemas.openxmlformats.org/officeDocument/2006/relationships" xmlns:p="http://schemas.openxmlformats.org/presentationml/2006/main">
   <p:cSld>
-    <p:bg>
-      <p:bgPr>
-        <a:solidFill>
-          <a:schemeClr val="bg1"/>
-        </a:solidFill>
-        <a:effectLst/>
-      </p:bgPr>
-    </p:bg>
     <p:spTree>
       <p:nvGrpSpPr>
         <p:cNvPr id="1" name=""/>
@@ -4938,41 +5902,52 @@
       </p:grpSpPr>
       <p:sp>
         <p:nvSpPr>
-          <p:cNvPr id="23" name="Rectangle 22">
+          <p:cNvPr id="2" name="Title 1">
             <a:extLst>
               <a:ext uri="{FF2B5EF4-FFF2-40B4-BE49-F238E27FC236}">
-                <a16:creationId xmlns:a16="http://schemas.microsoft.com/office/drawing/2014/main" id="{4E4490D0-3672-446A-AC12-B4830333BDDD}"/>
-              </a:ext>
-              <a:ext uri="{C183D7F6-B498-43B3-948B-1728B52AA6E4}">
-                <adec:decorative xmlns:adec="http://schemas.microsoft.com/office/drawing/2017/decorative" val="1"/>
+                <a16:creationId xmlns:a16="http://schemas.microsoft.com/office/drawing/2014/main" id="{CC689589-043A-4AC6-BB1B-14D035026AE0}"/>
               </a:ext>
             </a:extLst>
           </p:cNvPr>
           <p:cNvSpPr>
-            <a:spLocks noGrp="1" noRot="1" noChangeAspect="1" noMove="1" noResize="1" noEditPoints="1" noAdjustHandles="1" noChangeArrowheads="1" noChangeShapeType="1" noTextEdit="1"/>
-          </p:cNvSpPr>
-          <p:nvPr>
-            <p:extLst>
-              <p:ext uri="{386F3935-93C4-4BCD-93E2-E3B085C9AB24}">
-                <p16:designElem xmlns:p16="http://schemas.microsoft.com/office/powerpoint/2015/main" val="1"/>
-              </p:ext>
-            </p:extLst>
-          </p:nvPr>
-        </p:nvSpPr>
-        <p:spPr>
-          <a:xfrm>
-            <a:off x="3175" y="6400800"/>
-            <a:ext cx="12188825" cy="457200"/>
-          </a:xfrm>
-          <a:prstGeom prst="rect">
+            <a:spLocks noGrp="1"/>
+          </p:cNvSpPr>
+          <p:nvPr>
+            <p:ph type="title"/>
+          </p:nvPr>
+        </p:nvSpPr>
+        <p:spPr/>
+        <p:txBody>
+          <a:bodyPr/>
+          <a:lstStyle/>
+          <a:p>
+            <a:r>
+              <a:rPr lang="en-US" dirty="0"/>
+              <a:t>Code structure</a:t>
+            </a:r>
+          </a:p>
+        </p:txBody>
+      </p:sp>
+      <p:sp>
+        <p:nvSpPr>
+          <p:cNvPr id="4" name="Oval 3">
+            <a:extLst>
+              <a:ext uri="{FF2B5EF4-FFF2-40B4-BE49-F238E27FC236}">
+                <a16:creationId xmlns:a16="http://schemas.microsoft.com/office/drawing/2014/main" id="{3401A571-F4BA-48CA-B050-23181B1790F3}"/>
+              </a:ext>
+            </a:extLst>
+          </p:cNvPr>
+          <p:cNvSpPr/>
+          <p:nvPr/>
+        </p:nvSpPr>
+        <p:spPr>
+          <a:xfrm>
+            <a:off x="3460652" y="3559128"/>
+            <a:ext cx="1477107" cy="1181686"/>
+          </a:xfrm>
+          <a:prstGeom prst="ellipse">
             <a:avLst/>
           </a:prstGeom>
-          <a:solidFill>
-            <a:schemeClr val="accent2"/>
-          </a:solidFill>
-          <a:ln>
-            <a:noFill/>
-          </a:ln>
         </p:spPr>
         <p:style>
           <a:lnRef idx="2">
@@ -4990,44 +5965,38 @@
             <a:schemeClr val="lt1"/>
           </a:fontRef>
         </p:style>
-      </p:sp>
-      <p:sp>
-        <p:nvSpPr>
-          <p:cNvPr id="32" name="Rectangle 24">
+        <p:txBody>
+          <a:bodyPr rtlCol="0" anchor="ctr"/>
+          <a:lstStyle/>
+          <a:p>
+            <a:pPr algn="ctr"/>
+            <a:r>
+              <a:rPr lang="en-US" dirty="0"/>
+              <a:t>SVGlib.js</a:t>
+            </a:r>
+          </a:p>
+        </p:txBody>
+      </p:sp>
+      <p:sp>
+        <p:nvSpPr>
+          <p:cNvPr id="8" name="Oval 7">
             <a:extLst>
               <a:ext uri="{FF2B5EF4-FFF2-40B4-BE49-F238E27FC236}">
-                <a16:creationId xmlns:a16="http://schemas.microsoft.com/office/drawing/2014/main" id="{39CB82C2-DF65-4EC1-8280-F201D50F570B}"/>
-              </a:ext>
-              <a:ext uri="{C183D7F6-B498-43B3-948B-1728B52AA6E4}">
-                <adec:decorative xmlns:adec="http://schemas.microsoft.com/office/drawing/2017/decorative" val="1"/>
+                <a16:creationId xmlns:a16="http://schemas.microsoft.com/office/drawing/2014/main" id="{D15A48D7-57FB-4484-A6A9-643B69CBF04F}"/>
               </a:ext>
             </a:extLst>
           </p:cNvPr>
-          <p:cNvSpPr>
-            <a:spLocks noGrp="1" noRot="1" noChangeAspect="1" noMove="1" noResize="1" noEditPoints="1" noAdjustHandles="1" noChangeArrowheads="1" noChangeShapeType="1" noTextEdit="1"/>
-          </p:cNvSpPr>
-          <p:nvPr>
-            <p:extLst>
-              <p:ext uri="{386F3935-93C4-4BCD-93E2-E3B085C9AB24}">
-                <p16:designElem xmlns:p16="http://schemas.microsoft.com/office/powerpoint/2015/main" val="1"/>
-              </p:ext>
-            </p:extLst>
-          </p:nvPr>
-        </p:nvSpPr>
-        <p:spPr>
-          <a:xfrm>
-            <a:off x="15" y="6334316"/>
-            <a:ext cx="12188825" cy="64008"/>
-          </a:xfrm>
-          <a:prstGeom prst="rect">
+          <p:cNvSpPr/>
+          <p:nvPr/>
+        </p:nvSpPr>
+        <p:spPr>
+          <a:xfrm>
+            <a:off x="5141742" y="1867487"/>
+            <a:ext cx="1329396" cy="1181686"/>
+          </a:xfrm>
+          <a:prstGeom prst="ellipse">
             <a:avLst/>
           </a:prstGeom>
-          <a:solidFill>
-            <a:schemeClr val="accent1"/>
-          </a:solidFill>
-          <a:ln>
-            <a:noFill/>
-          </a:ln>
         </p:spPr>
         <p:style>
           <a:lnRef idx="2">
@@ -5045,159 +6014,38 @@
             <a:schemeClr val="lt1"/>
           </a:fontRef>
         </p:style>
-      </p:sp>
-      <p:cxnSp>
-        <p:nvCxnSpPr>
-          <p:cNvPr id="34" name="Straight Connector 26">
+        <p:txBody>
+          <a:bodyPr rtlCol="0" anchor="ctr"/>
+          <a:lstStyle/>
+          <a:p>
+            <a:pPr algn="ctr"/>
+            <a:r>
+              <a:rPr lang="en-US" dirty="0"/>
+              <a:t>index.js</a:t>
+            </a:r>
+          </a:p>
+        </p:txBody>
+      </p:sp>
+      <p:sp>
+        <p:nvSpPr>
+          <p:cNvPr id="9" name="Oval 8">
             <a:extLst>
               <a:ext uri="{FF2B5EF4-FFF2-40B4-BE49-F238E27FC236}">
-                <a16:creationId xmlns:a16="http://schemas.microsoft.com/office/drawing/2014/main" id="{7E1D4427-852B-4B37-8E76-0E9F1810BA2A}"/>
-              </a:ext>
-              <a:ext uri="{C183D7F6-B498-43B3-948B-1728B52AA6E4}">
-                <adec:decorative xmlns:adec="http://schemas.microsoft.com/office/drawing/2017/decorative" val="1"/>
+                <a16:creationId xmlns:a16="http://schemas.microsoft.com/office/drawing/2014/main" id="{659D3444-9913-465B-9AC8-B9F8FB9DA599}"/>
               </a:ext>
             </a:extLst>
           </p:cNvPr>
-          <p:cNvCxnSpPr>
-            <a:cxnSpLocks noGrp="1" noRot="1" noChangeAspect="1" noMove="1" noResize="1" noEditPoints="1" noAdjustHandles="1" noChangeArrowheads="1" noChangeShapeType="1"/>
-          </p:cNvCxnSpPr>
-          <p:nvPr>
-            <p:extLst>
-              <p:ext uri="{386F3935-93C4-4BCD-93E2-E3B085C9AB24}">
-                <p16:designElem xmlns:p16="http://schemas.microsoft.com/office/powerpoint/2015/main" val="1"/>
-              </p:ext>
-            </p:extLst>
-          </p:nvPr>
-        </p:nvCxnSpPr>
-        <p:spPr>
-          <a:xfrm>
-            <a:off x="1207658" y="4343400"/>
-            <a:ext cx="9875520" cy="0"/>
-          </a:xfrm>
-          <a:prstGeom prst="line">
+          <p:cNvSpPr/>
+          <p:nvPr/>
+        </p:nvSpPr>
+        <p:spPr>
+          <a:xfrm>
+            <a:off x="5208564" y="3559128"/>
+            <a:ext cx="1195753" cy="1181686"/>
+          </a:xfrm>
+          <a:prstGeom prst="ellipse">
             <a:avLst/>
           </a:prstGeom>
-          <a:ln w="6350">
-            <a:solidFill>
-              <a:schemeClr val="tx1">
-                <a:lumMod val="50000"/>
-                <a:lumOff val="50000"/>
-              </a:schemeClr>
-            </a:solidFill>
-          </a:ln>
-        </p:spPr>
-        <p:style>
-          <a:lnRef idx="1">
-            <a:schemeClr val="accent1"/>
-          </a:lnRef>
-          <a:fillRef idx="0">
-            <a:schemeClr val="accent1"/>
-          </a:fillRef>
-          <a:effectRef idx="0">
-            <a:schemeClr val="accent1"/>
-          </a:effectRef>
-          <a:fontRef idx="minor">
-            <a:schemeClr val="tx1"/>
-          </a:fontRef>
-        </p:style>
-      </p:cxnSp>
-      <p:sp useBgFill="1">
-        <p:nvSpPr>
-          <p:cNvPr id="35" name="Rectangle 28">
-            <a:extLst>
-              <a:ext uri="{FF2B5EF4-FFF2-40B4-BE49-F238E27FC236}">
-                <a16:creationId xmlns:a16="http://schemas.microsoft.com/office/drawing/2014/main" id="{5A1B47C8-47A0-4A88-8830-6DEA3B5DE392}"/>
-              </a:ext>
-              <a:ext uri="{C183D7F6-B498-43B3-948B-1728B52AA6E4}">
-                <adec:decorative xmlns:adec="http://schemas.microsoft.com/office/drawing/2017/decorative" val="1"/>
-              </a:ext>
-            </a:extLst>
-          </p:cNvPr>
-          <p:cNvSpPr>
-            <a:spLocks noGrp="1" noRot="1" noChangeAspect="1" noMove="1" noResize="1" noEditPoints="1" noAdjustHandles="1" noChangeArrowheads="1" noChangeShapeType="1" noTextEdit="1"/>
-          </p:cNvSpPr>
-          <p:nvPr>
-            <p:extLst>
-              <p:ext uri="{386F3935-93C4-4BCD-93E2-E3B085C9AB24}">
-                <p16:designElem xmlns:p16="http://schemas.microsoft.com/office/powerpoint/2015/main" val="1"/>
-              </p:ext>
-            </p:extLst>
-          </p:nvPr>
-        </p:nvSpPr>
-        <p:spPr>
-          <a:xfrm>
-            <a:off x="0" y="0"/>
-            <a:ext cx="12192000" cy="6858000"/>
-          </a:xfrm>
-          <a:prstGeom prst="rect">
-            <a:avLst/>
-          </a:prstGeom>
-          <a:ln>
-            <a:noFill/>
-          </a:ln>
-        </p:spPr>
-        <p:style>
-          <a:lnRef idx="2">
-            <a:schemeClr val="accent1">
-              <a:shade val="50000"/>
-            </a:schemeClr>
-          </a:lnRef>
-          <a:fillRef idx="1001">
-            <a:schemeClr val="lt1"/>
-          </a:fillRef>
-          <a:effectRef idx="0">
-            <a:schemeClr val="accent1"/>
-          </a:effectRef>
-          <a:fontRef idx="minor">
-            <a:schemeClr val="lt1"/>
-          </a:fontRef>
-        </p:style>
-        <p:txBody>
-          <a:bodyPr rtlCol="0" anchor="ctr"/>
-          <a:lstStyle/>
-          <a:p>
-            <a:pPr algn="ctr"/>
-            <a:endParaRPr lang="en-US"/>
-          </a:p>
-        </p:txBody>
-      </p:sp>
-      <p:sp>
-        <p:nvSpPr>
-          <p:cNvPr id="31" name="Rectangle 30">
-            <a:extLst>
-              <a:ext uri="{FF2B5EF4-FFF2-40B4-BE49-F238E27FC236}">
-                <a16:creationId xmlns:a16="http://schemas.microsoft.com/office/drawing/2014/main" id="{984BBFDD-E720-4805-A9C8-129FBBF6DD70}"/>
-              </a:ext>
-              <a:ext uri="{C183D7F6-B498-43B3-948B-1728B52AA6E4}">
-                <adec:decorative xmlns:adec="http://schemas.microsoft.com/office/drawing/2017/decorative" val="1"/>
-              </a:ext>
-            </a:extLst>
-          </p:cNvPr>
-          <p:cNvSpPr>
-            <a:spLocks noGrp="1" noRot="1" noChangeAspect="1" noMove="1" noResize="1" noEditPoints="1" noAdjustHandles="1" noChangeArrowheads="1" noChangeShapeType="1" noTextEdit="1"/>
-          </p:cNvSpPr>
-          <p:nvPr>
-            <p:extLst>
-              <p:ext uri="{386F3935-93C4-4BCD-93E2-E3B085C9AB24}">
-                <p16:designElem xmlns:p16="http://schemas.microsoft.com/office/powerpoint/2015/main" val="1"/>
-              </p:ext>
-            </p:extLst>
-          </p:nvPr>
-        </p:nvSpPr>
-        <p:spPr bwMode="white">
-          <a:xfrm>
-            <a:off x="7613486" y="0"/>
-            <a:ext cx="4584734" cy="6858000"/>
-          </a:xfrm>
-          <a:prstGeom prst="rect">
-            <a:avLst/>
-          </a:prstGeom>
-          <a:solidFill>
-            <a:schemeClr val="accent2"/>
-          </a:solidFill>
-          <a:ln>
-            <a:noFill/>
-          </a:ln>
         </p:spPr>
         <p:style>
           <a:lnRef idx="2">
@@ -5215,84 +6063,38 @@
             <a:schemeClr val="lt1"/>
           </a:fontRef>
         </p:style>
-      </p:sp>
-      <p:sp>
-        <p:nvSpPr>
-          <p:cNvPr id="2" name="Title 1">
+        <p:txBody>
+          <a:bodyPr rtlCol="0" anchor="ctr"/>
+          <a:lstStyle/>
+          <a:p>
+            <a:pPr algn="ctr"/>
+            <a:r>
+              <a:rPr lang="en-US" dirty="0"/>
+              <a:t>parser.js</a:t>
+            </a:r>
+          </a:p>
+        </p:txBody>
+      </p:sp>
+      <p:sp>
+        <p:nvSpPr>
+          <p:cNvPr id="10" name="Oval 9">
             <a:extLst>
               <a:ext uri="{FF2B5EF4-FFF2-40B4-BE49-F238E27FC236}">
-                <a16:creationId xmlns:a16="http://schemas.microsoft.com/office/drawing/2014/main" id="{3468051B-8DF3-46C8-8D35-EAC027A4A5BD}"/>
+                <a16:creationId xmlns:a16="http://schemas.microsoft.com/office/drawing/2014/main" id="{66293259-A5BA-448E-960E-F8528533455D}"/>
               </a:ext>
             </a:extLst>
           </p:cNvPr>
-          <p:cNvSpPr>
-            <a:spLocks noGrp="1"/>
-          </p:cNvSpPr>
-          <p:nvPr>
-            <p:ph type="title"/>
-          </p:nvPr>
-        </p:nvSpPr>
-        <p:spPr>
-          <a:xfrm>
-            <a:off x="8096885" y="640080"/>
-            <a:ext cx="3659246" cy="2926080"/>
-          </a:xfrm>
-        </p:spPr>
-        <p:txBody>
-          <a:bodyPr vert="horz" lIns="91440" tIns="45720" rIns="91440" bIns="45720" rtlCol="0" anchor="b">
-            <a:normAutofit/>
-          </a:bodyPr>
-          <a:lstStyle/>
-          <a:p>
-            <a:pPr algn="ctr"/>
-            <a:r>
-              <a:rPr lang="en-US" sz="4400" dirty="0">
-                <a:solidFill>
-                  <a:srgbClr val="FFFFFF"/>
-                </a:solidFill>
-              </a:rPr>
-              <a:t>Drawing the cells</a:t>
-            </a:r>
-          </a:p>
-        </p:txBody>
-      </p:sp>
-      <p:sp>
-        <p:nvSpPr>
-          <p:cNvPr id="33" name="Rectangle 32">
-            <a:extLst>
-              <a:ext uri="{FF2B5EF4-FFF2-40B4-BE49-F238E27FC236}">
-                <a16:creationId xmlns:a16="http://schemas.microsoft.com/office/drawing/2014/main" id="{5AC4BE46-4A77-42FE-9D15-065CDB2F847C}"/>
-              </a:ext>
-              <a:ext uri="{C183D7F6-B498-43B3-948B-1728B52AA6E4}">
-                <adec:decorative xmlns:adec="http://schemas.microsoft.com/office/drawing/2017/decorative" val="1"/>
-              </a:ext>
-            </a:extLst>
-          </p:cNvPr>
-          <p:cNvSpPr>
-            <a:spLocks noGrp="1" noRot="1" noChangeAspect="1" noMove="1" noResize="1" noEditPoints="1" noAdjustHandles="1" noChangeArrowheads="1" noChangeShapeType="1" noTextEdit="1"/>
-          </p:cNvSpPr>
-          <p:nvPr>
-            <p:extLst>
-              <p:ext uri="{386F3935-93C4-4BCD-93E2-E3B085C9AB24}">
-                <p16:designElem xmlns:p16="http://schemas.microsoft.com/office/powerpoint/2015/main" val="1"/>
-              </p:ext>
-            </p:extLst>
-          </p:nvPr>
-        </p:nvSpPr>
-        <p:spPr>
-          <a:xfrm>
-            <a:off x="7556906" y="0"/>
-            <a:ext cx="64008" cy="6858000"/>
-          </a:xfrm>
-          <a:prstGeom prst="rect">
+          <p:cNvSpPr/>
+          <p:nvPr/>
+        </p:nvSpPr>
+        <p:spPr>
+          <a:xfrm>
+            <a:off x="6874329" y="3559128"/>
+            <a:ext cx="1195753" cy="1181686"/>
+          </a:xfrm>
+          <a:prstGeom prst="ellipse">
             <a:avLst/>
           </a:prstGeom>
-          <a:solidFill>
-            <a:schemeClr val="accent1"/>
-          </a:solidFill>
-          <a:ln>
-            <a:noFill/>
-          </a:ln>
         </p:spPr>
         <p:style>
           <a:lnRef idx="2">
@@ -5310,46 +6112,243 @@
             <a:schemeClr val="lt1"/>
           </a:fontRef>
         </p:style>
-      </p:sp>
-      <p:pic>
-        <p:nvPicPr>
-          <p:cNvPr id="9" name="Content Placeholder 8">
+        <p:txBody>
+          <a:bodyPr rtlCol="0" anchor="ctr"/>
+          <a:lstStyle/>
+          <a:p>
+            <a:pPr algn="ctr"/>
+            <a:r>
+              <a:rPr lang="en-US" dirty="0"/>
+              <a:t>drc.js</a:t>
+            </a:r>
+          </a:p>
+        </p:txBody>
+      </p:sp>
+      <p:sp>
+        <p:nvSpPr>
+          <p:cNvPr id="11" name="Oval 10">
             <a:extLst>
               <a:ext uri="{FF2B5EF4-FFF2-40B4-BE49-F238E27FC236}">
-                <a16:creationId xmlns:a16="http://schemas.microsoft.com/office/drawing/2014/main" id="{7F44570C-BE75-43A5-987E-61248FFFC001}"/>
+                <a16:creationId xmlns:a16="http://schemas.microsoft.com/office/drawing/2014/main" id="{10AC1C3B-410D-4E75-8952-2F3B46CD244E}"/>
               </a:ext>
             </a:extLst>
           </p:cNvPr>
-          <p:cNvPicPr>
-            <a:picLocks noGrp="1" noChangeAspect="1"/>
-          </p:cNvPicPr>
-          <p:nvPr>
-            <p:ph idx="1"/>
-          </p:nvPr>
-        </p:nvPicPr>
-        <p:blipFill>
-          <a:blip r:embed="rId2">
+          <p:cNvSpPr/>
+          <p:nvPr/>
+        </p:nvSpPr>
+        <p:spPr>
+          <a:xfrm>
+            <a:off x="3460653" y="5019824"/>
+            <a:ext cx="1477106" cy="1181686"/>
+          </a:xfrm>
+          <a:prstGeom prst="ellipse">
+            <a:avLst/>
+          </a:prstGeom>
+        </p:spPr>
+        <p:style>
+          <a:lnRef idx="2">
+            <a:schemeClr val="accent1">
+              <a:shade val="50000"/>
+            </a:schemeClr>
+          </a:lnRef>
+          <a:fillRef idx="1">
+            <a:schemeClr val="accent1"/>
+          </a:fillRef>
+          <a:effectRef idx="0">
+            <a:schemeClr val="accent1"/>
+          </a:effectRef>
+          <a:fontRef idx="minor">
+            <a:schemeClr val="lt1"/>
+          </a:fontRef>
+        </p:style>
+        <p:txBody>
+          <a:bodyPr rtlCol="0" anchor="ctr"/>
+          <a:lstStyle/>
+          <a:p>
+            <a:pPr algn="ctr"/>
+            <a:r>
+              <a:rPr lang="en-US" dirty="0"/>
+              <a:t>svgZoomPan.js</a:t>
+            </a:r>
+          </a:p>
+        </p:txBody>
+      </p:sp>
+      <p:cxnSp>
+        <p:nvCxnSpPr>
+          <p:cNvPr id="13" name="Straight Arrow Connector 12">
             <a:extLst>
-              <a:ext uri="{28A0092B-C50C-407E-A947-70E740481C1C}">
-                <a14:useLocalDpi xmlns:a14="http://schemas.microsoft.com/office/drawing/2010/main" val="0"/>
+              <a:ext uri="{FF2B5EF4-FFF2-40B4-BE49-F238E27FC236}">
+                <a16:creationId xmlns:a16="http://schemas.microsoft.com/office/drawing/2014/main" id="{137BE32C-A857-48D1-B55E-B139C460E425}"/>
               </a:ext>
             </a:extLst>
-          </a:blip>
-          <a:stretch>
-            <a:fillRect/>
-          </a:stretch>
-        </p:blipFill>
-        <p:spPr>
-          <a:xfrm>
-            <a:off x="350775" y="160338"/>
-            <a:ext cx="6493759" cy="6479613"/>
-          </a:xfrm>
-        </p:spPr>
-      </p:pic>
+          </p:cNvPr>
+          <p:cNvCxnSpPr>
+            <a:cxnSpLocks/>
+            <a:stCxn id="4" idx="7"/>
+            <a:endCxn id="8" idx="3"/>
+          </p:cNvCxnSpPr>
+          <p:nvPr/>
+        </p:nvCxnSpPr>
+        <p:spPr>
+          <a:xfrm flipV="1">
+            <a:off x="4721442" y="2876119"/>
+            <a:ext cx="614986" cy="856063"/>
+          </a:xfrm>
+          <a:prstGeom prst="straightConnector1">
+            <a:avLst/>
+          </a:prstGeom>
+          <a:ln>
+            <a:tailEnd type="triangle"/>
+          </a:ln>
+        </p:spPr>
+        <p:style>
+          <a:lnRef idx="1">
+            <a:schemeClr val="accent1"/>
+          </a:lnRef>
+          <a:fillRef idx="0">
+            <a:schemeClr val="accent1"/>
+          </a:fillRef>
+          <a:effectRef idx="0">
+            <a:schemeClr val="accent1"/>
+          </a:effectRef>
+          <a:fontRef idx="minor">
+            <a:schemeClr val="tx1"/>
+          </a:fontRef>
+        </p:style>
+      </p:cxnSp>
+      <p:cxnSp>
+        <p:nvCxnSpPr>
+          <p:cNvPr id="15" name="Straight Arrow Connector 14">
+            <a:extLst>
+              <a:ext uri="{FF2B5EF4-FFF2-40B4-BE49-F238E27FC236}">
+                <a16:creationId xmlns:a16="http://schemas.microsoft.com/office/drawing/2014/main" id="{AAA554F1-A5A4-4863-ADF2-271AD03E92CB}"/>
+              </a:ext>
+            </a:extLst>
+          </p:cNvPr>
+          <p:cNvCxnSpPr>
+            <a:cxnSpLocks/>
+            <a:stCxn id="9" idx="0"/>
+            <a:endCxn id="8" idx="4"/>
+          </p:cNvCxnSpPr>
+          <p:nvPr/>
+        </p:nvCxnSpPr>
+        <p:spPr>
+          <a:xfrm flipH="1" flipV="1">
+            <a:off x="5806440" y="3049173"/>
+            <a:ext cx="1" cy="509955"/>
+          </a:xfrm>
+          <a:prstGeom prst="straightConnector1">
+            <a:avLst/>
+          </a:prstGeom>
+          <a:ln>
+            <a:tailEnd type="triangle"/>
+          </a:ln>
+        </p:spPr>
+        <p:style>
+          <a:lnRef idx="1">
+            <a:schemeClr val="accent1"/>
+          </a:lnRef>
+          <a:fillRef idx="0">
+            <a:schemeClr val="accent1"/>
+          </a:fillRef>
+          <a:effectRef idx="0">
+            <a:schemeClr val="accent1"/>
+          </a:effectRef>
+          <a:fontRef idx="minor">
+            <a:schemeClr val="tx1"/>
+          </a:fontRef>
+        </p:style>
+      </p:cxnSp>
+      <p:cxnSp>
+        <p:nvCxnSpPr>
+          <p:cNvPr id="19" name="Straight Arrow Connector 18">
+            <a:extLst>
+              <a:ext uri="{FF2B5EF4-FFF2-40B4-BE49-F238E27FC236}">
+                <a16:creationId xmlns:a16="http://schemas.microsoft.com/office/drawing/2014/main" id="{26A25D59-FA0E-4DEC-BFE6-67E7EFB360FC}"/>
+              </a:ext>
+            </a:extLst>
+          </p:cNvPr>
+          <p:cNvCxnSpPr>
+            <a:cxnSpLocks/>
+            <a:stCxn id="10" idx="0"/>
+            <a:endCxn id="8" idx="5"/>
+          </p:cNvCxnSpPr>
+          <p:nvPr/>
+        </p:nvCxnSpPr>
+        <p:spPr>
+          <a:xfrm flipH="1" flipV="1">
+            <a:off x="6276452" y="2876119"/>
+            <a:ext cx="1195754" cy="683009"/>
+          </a:xfrm>
+          <a:prstGeom prst="straightConnector1">
+            <a:avLst/>
+          </a:prstGeom>
+          <a:ln>
+            <a:tailEnd type="triangle"/>
+          </a:ln>
+        </p:spPr>
+        <p:style>
+          <a:lnRef idx="1">
+            <a:schemeClr val="accent1"/>
+          </a:lnRef>
+          <a:fillRef idx="0">
+            <a:schemeClr val="accent1"/>
+          </a:fillRef>
+          <a:effectRef idx="0">
+            <a:schemeClr val="accent1"/>
+          </a:effectRef>
+          <a:fontRef idx="minor">
+            <a:schemeClr val="tx1"/>
+          </a:fontRef>
+        </p:style>
+      </p:cxnSp>
+      <p:cxnSp>
+        <p:nvCxnSpPr>
+          <p:cNvPr id="21" name="Straight Arrow Connector 20">
+            <a:extLst>
+              <a:ext uri="{FF2B5EF4-FFF2-40B4-BE49-F238E27FC236}">
+                <a16:creationId xmlns:a16="http://schemas.microsoft.com/office/drawing/2014/main" id="{2163D8BC-9C6D-4959-9A45-F7604E0841D5}"/>
+              </a:ext>
+            </a:extLst>
+          </p:cNvPr>
+          <p:cNvCxnSpPr>
+            <a:cxnSpLocks/>
+            <a:stCxn id="11" idx="0"/>
+            <a:endCxn id="4" idx="4"/>
+          </p:cNvCxnSpPr>
+          <p:nvPr/>
+        </p:nvCxnSpPr>
+        <p:spPr>
+          <a:xfrm flipV="1">
+            <a:off x="4199206" y="4740814"/>
+            <a:ext cx="0" cy="279010"/>
+          </a:xfrm>
+          <a:prstGeom prst="straightConnector1">
+            <a:avLst/>
+          </a:prstGeom>
+          <a:ln>
+            <a:tailEnd type="triangle"/>
+          </a:ln>
+        </p:spPr>
+        <p:style>
+          <a:lnRef idx="1">
+            <a:schemeClr val="accent1"/>
+          </a:lnRef>
+          <a:fillRef idx="0">
+            <a:schemeClr val="accent1"/>
+          </a:fillRef>
+          <a:effectRef idx="0">
+            <a:schemeClr val="accent1"/>
+          </a:effectRef>
+          <a:fontRef idx="minor">
+            <a:schemeClr val="tx1"/>
+          </a:fontRef>
+        </p:style>
+      </p:cxnSp>
     </p:spTree>
     <p:extLst>
       <p:ext uri="{BB962C8B-B14F-4D97-AF65-F5344CB8AC3E}">
-        <p14:creationId xmlns:p14="http://schemas.microsoft.com/office/powerpoint/2010/main" val="4026913037"/>
+        <p14:creationId xmlns:p14="http://schemas.microsoft.com/office/powerpoint/2010/main" val="326264550"/>
       </p:ext>
     </p:extLst>
   </p:cSld>
@@ -5362,14 +6361,6 @@
 <file path=ppt/slides/slide6.xml><?xml version="1.0" encoding="utf-8"?>
 <p:sld xmlns:a="http://schemas.openxmlformats.org/drawingml/2006/main" xmlns:r="http://schemas.openxmlformats.org/officeDocument/2006/relationships" xmlns:p="http://schemas.openxmlformats.org/presentationml/2006/main">
   <p:cSld>
-    <p:bg>
-      <p:bgPr>
-        <a:solidFill>
-          <a:schemeClr val="bg1"/>
-        </a:solidFill>
-        <a:effectLst/>
-      </p:bgPr>
-    </p:bg>
     <p:spTree>
       <p:nvGrpSpPr>
         <p:cNvPr id="1" name=""/>
@@ -5386,235 +6377,38 @@
       </p:grpSpPr>
       <p:sp>
         <p:nvSpPr>
-          <p:cNvPr id="10" name="Rectangle 9">
+          <p:cNvPr id="2" name="Title 1">
             <a:extLst>
               <a:ext uri="{FF2B5EF4-FFF2-40B4-BE49-F238E27FC236}">
-                <a16:creationId xmlns:a16="http://schemas.microsoft.com/office/drawing/2014/main" id="{4E4490D0-3672-446A-AC12-B4830333BDDD}"/>
-              </a:ext>
-              <a:ext uri="{C183D7F6-B498-43B3-948B-1728B52AA6E4}">
-                <adec:decorative xmlns:adec="http://schemas.microsoft.com/office/drawing/2017/decorative" val="1"/>
+                <a16:creationId xmlns:a16="http://schemas.microsoft.com/office/drawing/2014/main" id="{3EFA21AD-DC79-4941-891C-0AB848BABA50}"/>
               </a:ext>
             </a:extLst>
           </p:cNvPr>
           <p:cNvSpPr>
-            <a:spLocks noGrp="1" noRot="1" noChangeAspect="1" noMove="1" noResize="1" noEditPoints="1" noAdjustHandles="1" noChangeArrowheads="1" noChangeShapeType="1" noTextEdit="1"/>
-          </p:cNvSpPr>
-          <p:nvPr>
-            <p:extLst>
-              <p:ext uri="{386F3935-93C4-4BCD-93E2-E3B085C9AB24}">
-                <p16:designElem xmlns:p16="http://schemas.microsoft.com/office/powerpoint/2015/main" val="1"/>
-              </p:ext>
-            </p:extLst>
-          </p:nvPr>
-        </p:nvSpPr>
-        <p:spPr>
-          <a:xfrm>
-            <a:off x="3175" y="6400800"/>
-            <a:ext cx="12188825" cy="457200"/>
-          </a:xfrm>
-          <a:prstGeom prst="rect">
-            <a:avLst/>
-          </a:prstGeom>
-          <a:solidFill>
-            <a:schemeClr val="accent2"/>
-          </a:solidFill>
-          <a:ln>
-            <a:noFill/>
-          </a:ln>
-        </p:spPr>
-        <p:style>
-          <a:lnRef idx="2">
-            <a:schemeClr val="accent1">
-              <a:shade val="50000"/>
-            </a:schemeClr>
-          </a:lnRef>
-          <a:fillRef idx="1">
-            <a:schemeClr val="accent1"/>
-          </a:fillRef>
-          <a:effectRef idx="0">
-            <a:schemeClr val="accent1"/>
-          </a:effectRef>
-          <a:fontRef idx="minor">
-            <a:schemeClr val="lt1"/>
-          </a:fontRef>
-        </p:style>
-      </p:sp>
-      <p:sp>
-        <p:nvSpPr>
-          <p:cNvPr id="12" name="Rectangle 11">
+            <a:spLocks noGrp="1"/>
+          </p:cNvSpPr>
+          <p:nvPr>
+            <p:ph type="title"/>
+          </p:nvPr>
+        </p:nvSpPr>
+        <p:spPr/>
+        <p:txBody>
+          <a:bodyPr/>
+          <a:lstStyle/>
+          <a:p>
+            <a:r>
+              <a:rPr lang="en-US" dirty="0"/>
+              <a:t>Parsing the DEF and LEF files.</a:t>
+            </a:r>
+          </a:p>
+        </p:txBody>
+      </p:sp>
+      <p:pic>
+        <p:nvPicPr>
+          <p:cNvPr id="5" name="Content Placeholder 4" descr="A screenshot of a cell phone&#10;&#10;Description automatically generated">
             <a:extLst>
               <a:ext uri="{FF2B5EF4-FFF2-40B4-BE49-F238E27FC236}">
-                <a16:creationId xmlns:a16="http://schemas.microsoft.com/office/drawing/2014/main" id="{39CB82C2-DF65-4EC1-8280-F201D50F570B}"/>
-              </a:ext>
-              <a:ext uri="{C183D7F6-B498-43B3-948B-1728B52AA6E4}">
-                <adec:decorative xmlns:adec="http://schemas.microsoft.com/office/drawing/2017/decorative" val="1"/>
-              </a:ext>
-            </a:extLst>
-          </p:cNvPr>
-          <p:cNvSpPr>
-            <a:spLocks noGrp="1" noRot="1" noChangeAspect="1" noMove="1" noResize="1" noEditPoints="1" noAdjustHandles="1" noChangeArrowheads="1" noChangeShapeType="1" noTextEdit="1"/>
-          </p:cNvSpPr>
-          <p:nvPr>
-            <p:extLst>
-              <p:ext uri="{386F3935-93C4-4BCD-93E2-E3B085C9AB24}">
-                <p16:designElem xmlns:p16="http://schemas.microsoft.com/office/powerpoint/2015/main" val="1"/>
-              </p:ext>
-            </p:extLst>
-          </p:nvPr>
-        </p:nvSpPr>
-        <p:spPr>
-          <a:xfrm>
-            <a:off x="15" y="6334316"/>
-            <a:ext cx="12188825" cy="64008"/>
-          </a:xfrm>
-          <a:prstGeom prst="rect">
-            <a:avLst/>
-          </a:prstGeom>
-          <a:solidFill>
-            <a:schemeClr val="accent1"/>
-          </a:solidFill>
-          <a:ln>
-            <a:noFill/>
-          </a:ln>
-        </p:spPr>
-        <p:style>
-          <a:lnRef idx="2">
-            <a:schemeClr val="accent1">
-              <a:shade val="50000"/>
-            </a:schemeClr>
-          </a:lnRef>
-          <a:fillRef idx="1">
-            <a:schemeClr val="accent1"/>
-          </a:fillRef>
-          <a:effectRef idx="0">
-            <a:schemeClr val="accent1"/>
-          </a:effectRef>
-          <a:fontRef idx="minor">
-            <a:schemeClr val="lt1"/>
-          </a:fontRef>
-        </p:style>
-      </p:sp>
-      <p:cxnSp>
-        <p:nvCxnSpPr>
-          <p:cNvPr id="14" name="Straight Connector 13">
-            <a:extLst>
-              <a:ext uri="{FF2B5EF4-FFF2-40B4-BE49-F238E27FC236}">
-                <a16:creationId xmlns:a16="http://schemas.microsoft.com/office/drawing/2014/main" id="{7E1D4427-852B-4B37-8E76-0E9F1810BA2A}"/>
-              </a:ext>
-              <a:ext uri="{C183D7F6-B498-43B3-948B-1728B52AA6E4}">
-                <adec:decorative xmlns:adec="http://schemas.microsoft.com/office/drawing/2017/decorative" val="1"/>
-              </a:ext>
-            </a:extLst>
-          </p:cNvPr>
-          <p:cNvCxnSpPr>
-            <a:cxnSpLocks noGrp="1" noRot="1" noChangeAspect="1" noMove="1" noResize="1" noEditPoints="1" noAdjustHandles="1" noChangeArrowheads="1" noChangeShapeType="1"/>
-          </p:cNvCxnSpPr>
-          <p:nvPr>
-            <p:extLst>
-              <p:ext uri="{386F3935-93C4-4BCD-93E2-E3B085C9AB24}">
-                <p16:designElem xmlns:p16="http://schemas.microsoft.com/office/powerpoint/2015/main" val="1"/>
-              </p:ext>
-            </p:extLst>
-          </p:nvPr>
-        </p:nvCxnSpPr>
-        <p:spPr>
-          <a:xfrm>
-            <a:off x="1207658" y="4343400"/>
-            <a:ext cx="9875520" cy="0"/>
-          </a:xfrm>
-          <a:prstGeom prst="line">
-            <a:avLst/>
-          </a:prstGeom>
-          <a:ln w="6350">
-            <a:solidFill>
-              <a:schemeClr val="tx1">
-                <a:lumMod val="50000"/>
-                <a:lumOff val="50000"/>
-              </a:schemeClr>
-            </a:solidFill>
-          </a:ln>
-        </p:spPr>
-        <p:style>
-          <a:lnRef idx="1">
-            <a:schemeClr val="accent1"/>
-          </a:lnRef>
-          <a:fillRef idx="0">
-            <a:schemeClr val="accent1"/>
-          </a:fillRef>
-          <a:effectRef idx="0">
-            <a:schemeClr val="accent1"/>
-          </a:effectRef>
-          <a:fontRef idx="minor">
-            <a:schemeClr val="tx1"/>
-          </a:fontRef>
-        </p:style>
-      </p:cxnSp>
-      <p:sp useBgFill="1">
-        <p:nvSpPr>
-          <p:cNvPr id="16" name="Rectangle 15">
-            <a:extLst>
-              <a:ext uri="{FF2B5EF4-FFF2-40B4-BE49-F238E27FC236}">
-                <a16:creationId xmlns:a16="http://schemas.microsoft.com/office/drawing/2014/main" id="{5A1B47C8-47A0-4A88-8830-6DEA3B5DE392}"/>
-              </a:ext>
-              <a:ext uri="{C183D7F6-B498-43B3-948B-1728B52AA6E4}">
-                <adec:decorative xmlns:adec="http://schemas.microsoft.com/office/drawing/2017/decorative" val="1"/>
-              </a:ext>
-            </a:extLst>
-          </p:cNvPr>
-          <p:cNvSpPr>
-            <a:spLocks noGrp="1" noRot="1" noChangeAspect="1" noMove="1" noResize="1" noEditPoints="1" noAdjustHandles="1" noChangeArrowheads="1" noChangeShapeType="1" noTextEdit="1"/>
-          </p:cNvSpPr>
-          <p:nvPr>
-            <p:extLst>
-              <p:ext uri="{386F3935-93C4-4BCD-93E2-E3B085C9AB24}">
-                <p16:designElem xmlns:p16="http://schemas.microsoft.com/office/powerpoint/2015/main" val="1"/>
-              </p:ext>
-            </p:extLst>
-          </p:nvPr>
-        </p:nvSpPr>
-        <p:spPr>
-          <a:xfrm>
-            <a:off x="0" y="0"/>
-            <a:ext cx="12192000" cy="6858000"/>
-          </a:xfrm>
-          <a:prstGeom prst="rect">
-            <a:avLst/>
-          </a:prstGeom>
-          <a:ln>
-            <a:noFill/>
-          </a:ln>
-        </p:spPr>
-        <p:style>
-          <a:lnRef idx="2">
-            <a:schemeClr val="accent1">
-              <a:shade val="50000"/>
-            </a:schemeClr>
-          </a:lnRef>
-          <a:fillRef idx="1001">
-            <a:schemeClr val="lt1"/>
-          </a:fillRef>
-          <a:effectRef idx="0">
-            <a:schemeClr val="accent1"/>
-          </a:effectRef>
-          <a:fontRef idx="minor">
-            <a:schemeClr val="lt1"/>
-          </a:fontRef>
-        </p:style>
-        <p:txBody>
-          <a:bodyPr rtlCol="0" anchor="ctr"/>
-          <a:lstStyle/>
-          <a:p>
-            <a:pPr algn="ctr"/>
-            <a:endParaRPr lang="en-US"/>
-          </a:p>
-        </p:txBody>
-      </p:sp>
-      <p:pic>
-        <p:nvPicPr>
-          <p:cNvPr id="5" name="Content Placeholder 4" descr="A picture containing text, boat, plane, large&#10;&#10;Description automatically generated">
-            <a:extLst>
-              <a:ext uri="{FF2B5EF4-FFF2-40B4-BE49-F238E27FC236}">
-                <a16:creationId xmlns:a16="http://schemas.microsoft.com/office/drawing/2014/main" id="{6B5D33CA-6253-40D2-8A4D-B115993DA2B4}"/>
+                <a16:creationId xmlns:a16="http://schemas.microsoft.com/office/drawing/2014/main" id="{65BFA94D-2620-48F5-8999-4D47BB3FE20D}"/>
               </a:ext>
             </a:extLst>
           </p:cNvPr>
@@ -5639,168 +6433,15 @@
         </p:blipFill>
         <p:spPr>
           <a:xfrm>
-            <a:off x="989002" y="640080"/>
-            <a:ext cx="5565661" cy="5577840"/>
-          </a:xfrm>
-          <a:prstGeom prst="rect">
-            <a:avLst/>
-          </a:prstGeom>
+            <a:off x="1265444" y="2053882"/>
+            <a:ext cx="9205852" cy="3812345"/>
+          </a:xfrm>
         </p:spPr>
       </p:pic>
-      <p:sp>
-        <p:nvSpPr>
-          <p:cNvPr id="18" name="Rectangle 17">
-            <a:extLst>
-              <a:ext uri="{FF2B5EF4-FFF2-40B4-BE49-F238E27FC236}">
-                <a16:creationId xmlns:a16="http://schemas.microsoft.com/office/drawing/2014/main" id="{984BBFDD-E720-4805-A9C8-129FBBF6DD70}"/>
-              </a:ext>
-              <a:ext uri="{C183D7F6-B498-43B3-948B-1728B52AA6E4}">
-                <adec:decorative xmlns:adec="http://schemas.microsoft.com/office/drawing/2017/decorative" val="1"/>
-              </a:ext>
-            </a:extLst>
-          </p:cNvPr>
-          <p:cNvSpPr>
-            <a:spLocks noGrp="1" noRot="1" noChangeAspect="1" noMove="1" noResize="1" noEditPoints="1" noAdjustHandles="1" noChangeArrowheads="1" noChangeShapeType="1" noTextEdit="1"/>
-          </p:cNvSpPr>
-          <p:nvPr>
-            <p:extLst>
-              <p:ext uri="{386F3935-93C4-4BCD-93E2-E3B085C9AB24}">
-                <p16:designElem xmlns:p16="http://schemas.microsoft.com/office/powerpoint/2015/main" val="1"/>
-              </p:ext>
-            </p:extLst>
-          </p:nvPr>
-        </p:nvSpPr>
-        <p:spPr bwMode="white">
-          <a:xfrm>
-            <a:off x="7613486" y="0"/>
-            <a:ext cx="4584734" cy="6858000"/>
-          </a:xfrm>
-          <a:prstGeom prst="rect">
-            <a:avLst/>
-          </a:prstGeom>
-          <a:solidFill>
-            <a:schemeClr val="accent2"/>
-          </a:solidFill>
-          <a:ln>
-            <a:noFill/>
-          </a:ln>
-        </p:spPr>
-        <p:style>
-          <a:lnRef idx="2">
-            <a:schemeClr val="accent1">
-              <a:shade val="50000"/>
-            </a:schemeClr>
-          </a:lnRef>
-          <a:fillRef idx="1">
-            <a:schemeClr val="accent1"/>
-          </a:fillRef>
-          <a:effectRef idx="0">
-            <a:schemeClr val="accent1"/>
-          </a:effectRef>
-          <a:fontRef idx="minor">
-            <a:schemeClr val="lt1"/>
-          </a:fontRef>
-        </p:style>
-      </p:sp>
-      <p:sp>
-        <p:nvSpPr>
-          <p:cNvPr id="2" name="Title 1">
-            <a:extLst>
-              <a:ext uri="{FF2B5EF4-FFF2-40B4-BE49-F238E27FC236}">
-                <a16:creationId xmlns:a16="http://schemas.microsoft.com/office/drawing/2014/main" id="{CF6DE23D-3945-4FDD-880A-69BD56509E9B}"/>
-              </a:ext>
-            </a:extLst>
-          </p:cNvPr>
-          <p:cNvSpPr>
-            <a:spLocks noGrp="1"/>
-          </p:cNvSpPr>
-          <p:nvPr>
-            <p:ph type="title"/>
-          </p:nvPr>
-        </p:nvSpPr>
-        <p:spPr>
-          <a:xfrm>
-            <a:off x="8096885" y="640080"/>
-            <a:ext cx="3659246" cy="2926080"/>
-          </a:xfrm>
-        </p:spPr>
-        <p:txBody>
-          <a:bodyPr vert="horz" lIns="91440" tIns="45720" rIns="91440" bIns="45720" rtlCol="0" anchor="b">
-            <a:normAutofit/>
-          </a:bodyPr>
-          <a:lstStyle/>
-          <a:p>
-            <a:pPr algn="ctr"/>
-            <a:r>
-              <a:rPr lang="en-US" sz="4400" dirty="0">
-                <a:solidFill>
-                  <a:srgbClr val="FFFFFF"/>
-                </a:solidFill>
-              </a:rPr>
-              <a:t>Drawing the pins</a:t>
-            </a:r>
-          </a:p>
-        </p:txBody>
-      </p:sp>
-      <p:sp>
-        <p:nvSpPr>
-          <p:cNvPr id="20" name="Rectangle 19">
-            <a:extLst>
-              <a:ext uri="{FF2B5EF4-FFF2-40B4-BE49-F238E27FC236}">
-                <a16:creationId xmlns:a16="http://schemas.microsoft.com/office/drawing/2014/main" id="{5AC4BE46-4A77-42FE-9D15-065CDB2F847C}"/>
-              </a:ext>
-              <a:ext uri="{C183D7F6-B498-43B3-948B-1728B52AA6E4}">
-                <adec:decorative xmlns:adec="http://schemas.microsoft.com/office/drawing/2017/decorative" val="1"/>
-              </a:ext>
-            </a:extLst>
-          </p:cNvPr>
-          <p:cNvSpPr>
-            <a:spLocks noGrp="1" noRot="1" noChangeAspect="1" noMove="1" noResize="1" noEditPoints="1" noAdjustHandles="1" noChangeArrowheads="1" noChangeShapeType="1" noTextEdit="1"/>
-          </p:cNvSpPr>
-          <p:nvPr>
-            <p:extLst>
-              <p:ext uri="{386F3935-93C4-4BCD-93E2-E3B085C9AB24}">
-                <p16:designElem xmlns:p16="http://schemas.microsoft.com/office/powerpoint/2015/main" val="1"/>
-              </p:ext>
-            </p:extLst>
-          </p:nvPr>
-        </p:nvSpPr>
-        <p:spPr>
-          <a:xfrm>
-            <a:off x="7556906" y="0"/>
-            <a:ext cx="64008" cy="6858000"/>
-          </a:xfrm>
-          <a:prstGeom prst="rect">
-            <a:avLst/>
-          </a:prstGeom>
-          <a:solidFill>
-            <a:schemeClr val="accent1"/>
-          </a:solidFill>
-          <a:ln>
-            <a:noFill/>
-          </a:ln>
-        </p:spPr>
-        <p:style>
-          <a:lnRef idx="2">
-            <a:schemeClr val="accent1">
-              <a:shade val="50000"/>
-            </a:schemeClr>
-          </a:lnRef>
-          <a:fillRef idx="1">
-            <a:schemeClr val="accent1"/>
-          </a:fillRef>
-          <a:effectRef idx="0">
-            <a:schemeClr val="accent1"/>
-          </a:effectRef>
-          <a:fontRef idx="minor">
-            <a:schemeClr val="lt1"/>
-          </a:fontRef>
-        </p:style>
-      </p:sp>
     </p:spTree>
     <p:extLst>
       <p:ext uri="{BB962C8B-B14F-4D97-AF65-F5344CB8AC3E}">
-        <p14:creationId xmlns:p14="http://schemas.microsoft.com/office/powerpoint/2010/main" val="4283267399"/>
+        <p14:creationId xmlns:p14="http://schemas.microsoft.com/office/powerpoint/2010/main" val="1010133248"/>
       </p:ext>
     </p:extLst>
   </p:cSld>
@@ -5837,7 +6478,7 @@
       </p:grpSpPr>
       <p:sp>
         <p:nvSpPr>
-          <p:cNvPr id="10" name="Rectangle 9">
+          <p:cNvPr id="40" name="Rectangle 39">
             <a:extLst>
               <a:ext uri="{FF2B5EF4-FFF2-40B4-BE49-F238E27FC236}">
                 <a16:creationId xmlns:a16="http://schemas.microsoft.com/office/drawing/2014/main" id="{4E4490D0-3672-446A-AC12-B4830333BDDD}"/>
@@ -5892,7 +6533,7 @@
       </p:sp>
       <p:sp>
         <p:nvSpPr>
-          <p:cNvPr id="12" name="Rectangle 11">
+          <p:cNvPr id="42" name="Rectangle 41">
             <a:extLst>
               <a:ext uri="{FF2B5EF4-FFF2-40B4-BE49-F238E27FC236}">
                 <a16:creationId xmlns:a16="http://schemas.microsoft.com/office/drawing/2014/main" id="{39CB82C2-DF65-4EC1-8280-F201D50F570B}"/>
@@ -5947,7 +6588,7 @@
       </p:sp>
       <p:cxnSp>
         <p:nvCxnSpPr>
-          <p:cNvPr id="14" name="Straight Connector 13">
+          <p:cNvPr id="44" name="Straight Connector 43">
             <a:extLst>
               <a:ext uri="{FF2B5EF4-FFF2-40B4-BE49-F238E27FC236}">
                 <a16:creationId xmlns:a16="http://schemas.microsoft.com/office/drawing/2014/main" id="{7E1D4427-852B-4B37-8E76-0E9F1810BA2A}"/>
@@ -6002,7 +6643,7 @@
       </p:cxnSp>
       <p:sp useBgFill="1">
         <p:nvSpPr>
-          <p:cNvPr id="16" name="Rectangle 15">
+          <p:cNvPr id="46" name="Rectangle 45">
             <a:extLst>
               <a:ext uri="{FF2B5EF4-FFF2-40B4-BE49-F238E27FC236}">
                 <a16:creationId xmlns:a16="http://schemas.microsoft.com/office/drawing/2014/main" id="{5A1B47C8-47A0-4A88-8830-6DEA3B5DE392}"/>
@@ -6062,10 +6703,10 @@
       </p:sp>
       <p:pic>
         <p:nvPicPr>
-          <p:cNvPr id="5" name="Content Placeholder 4" descr="A close up of text on a white background&#10;&#10;Description automatically generated">
+          <p:cNvPr id="4" name="Content Placeholder 3" descr="A picture containing drawing&#10;&#10;Description automatically generated">
             <a:extLst>
               <a:ext uri="{FF2B5EF4-FFF2-40B4-BE49-F238E27FC236}">
-                <a16:creationId xmlns:a16="http://schemas.microsoft.com/office/drawing/2014/main" id="{8E302120-C14F-4B77-91A0-A02237076448}"/>
+                <a16:creationId xmlns:a16="http://schemas.microsoft.com/office/drawing/2014/main" id="{BEAB364F-EBC1-4DE1-B032-84F4F1A9F051}"/>
               </a:ext>
             </a:extLst>
           </p:cNvPr>
@@ -6090,8 +6731,8 @@
         </p:blipFill>
         <p:spPr>
           <a:xfrm>
-            <a:off x="858494" y="491921"/>
-            <a:ext cx="5839919" cy="5839919"/>
+            <a:off x="988413" y="640080"/>
+            <a:ext cx="5566838" cy="5577840"/>
           </a:xfrm>
           <a:prstGeom prst="rect">
             <a:avLst/>
@@ -6100,7 +6741,7 @@
       </p:pic>
       <p:sp>
         <p:nvSpPr>
-          <p:cNvPr id="18" name="Rectangle 17">
+          <p:cNvPr id="48" name="Rectangle 47">
             <a:extLst>
               <a:ext uri="{FF2B5EF4-FFF2-40B4-BE49-F238E27FC236}">
                 <a16:creationId xmlns:a16="http://schemas.microsoft.com/office/drawing/2014/main" id="{984BBFDD-E720-4805-A9C8-129FBBF6DD70}"/>
@@ -6158,7 +6799,7 @@
           <p:cNvPr id="2" name="Title 1">
             <a:extLst>
               <a:ext uri="{FF2B5EF4-FFF2-40B4-BE49-F238E27FC236}">
-                <a16:creationId xmlns:a16="http://schemas.microsoft.com/office/drawing/2014/main" id="{895556BE-D89C-4DF8-9788-DC128F33F033}"/>
+                <a16:creationId xmlns:a16="http://schemas.microsoft.com/office/drawing/2014/main" id="{3468051B-8DF3-46C8-8D35-EAC027A4A5BD}"/>
               </a:ext>
             </a:extLst>
           </p:cNvPr>
@@ -6181,21 +6822,20 @@
           </a:bodyPr>
           <a:lstStyle/>
           <a:p>
-            <a:pPr algn="ctr"/>
-            <a:r>
-              <a:rPr lang="en-US" sz="4400" dirty="0">
+            <a:r>
+              <a:rPr lang="en-US" sz="4400">
                 <a:solidFill>
                   <a:srgbClr val="FFFFFF"/>
                 </a:solidFill>
               </a:rPr>
-              <a:t>Drawing the Nets</a:t>
-            </a:r>
-          </a:p>
-        </p:txBody>
-      </p:sp>
-      <p:sp>
-        <p:nvSpPr>
-          <p:cNvPr id="20" name="Rectangle 19">
+              <a:t>Drawing the cells</a:t>
+            </a:r>
+          </a:p>
+        </p:txBody>
+      </p:sp>
+      <p:sp>
+        <p:nvSpPr>
+          <p:cNvPr id="50" name="Rectangle 49">
             <a:extLst>
               <a:ext uri="{FF2B5EF4-FFF2-40B4-BE49-F238E27FC236}">
                 <a16:creationId xmlns:a16="http://schemas.microsoft.com/office/drawing/2014/main" id="{5AC4BE46-4A77-42FE-9D15-065CDB2F847C}"/>
@@ -6251,7 +6891,7 @@
     </p:spTree>
     <p:extLst>
       <p:ext uri="{BB962C8B-B14F-4D97-AF65-F5344CB8AC3E}">
-        <p14:creationId xmlns:p14="http://schemas.microsoft.com/office/powerpoint/2010/main" val="3550077156"/>
+        <p14:creationId xmlns:p14="http://schemas.microsoft.com/office/powerpoint/2010/main" val="4026913037"/>
       </p:ext>
     </p:extLst>
   </p:cSld>
@@ -6288,7 +6928,7 @@
       </p:grpSpPr>
       <p:sp>
         <p:nvSpPr>
-          <p:cNvPr id="10" name="Rectangle 9">
+          <p:cNvPr id="25" name="Rectangle 24">
             <a:extLst>
               <a:ext uri="{FF2B5EF4-FFF2-40B4-BE49-F238E27FC236}">
                 <a16:creationId xmlns:a16="http://schemas.microsoft.com/office/drawing/2014/main" id="{4E4490D0-3672-446A-AC12-B4830333BDDD}"/>
@@ -6343,7 +6983,7 @@
       </p:sp>
       <p:sp>
         <p:nvSpPr>
-          <p:cNvPr id="12" name="Rectangle 11">
+          <p:cNvPr id="27" name="Rectangle 26">
             <a:extLst>
               <a:ext uri="{FF2B5EF4-FFF2-40B4-BE49-F238E27FC236}">
                 <a16:creationId xmlns:a16="http://schemas.microsoft.com/office/drawing/2014/main" id="{39CB82C2-DF65-4EC1-8280-F201D50F570B}"/>
@@ -6398,7 +7038,7 @@
       </p:sp>
       <p:cxnSp>
         <p:nvCxnSpPr>
-          <p:cNvPr id="14" name="Straight Connector 13">
+          <p:cNvPr id="29" name="Straight Connector 28">
             <a:extLst>
               <a:ext uri="{FF2B5EF4-FFF2-40B4-BE49-F238E27FC236}">
                 <a16:creationId xmlns:a16="http://schemas.microsoft.com/office/drawing/2014/main" id="{7E1D4427-852B-4B37-8E76-0E9F1810BA2A}"/>
@@ -6453,7 +7093,7 @@
       </p:cxnSp>
       <p:sp useBgFill="1">
         <p:nvSpPr>
-          <p:cNvPr id="16" name="Rectangle 15">
+          <p:cNvPr id="31" name="Rectangle 30">
             <a:extLst>
               <a:ext uri="{FF2B5EF4-FFF2-40B4-BE49-F238E27FC236}">
                 <a16:creationId xmlns:a16="http://schemas.microsoft.com/office/drawing/2014/main" id="{5A1B47C8-47A0-4A88-8830-6DEA3B5DE392}"/>
@@ -6513,10 +7153,10 @@
       </p:sp>
       <p:pic>
         <p:nvPicPr>
-          <p:cNvPr id="5" name="Content Placeholder 4" descr="A picture containing crossword, text&#10;&#10;Description automatically generated">
+          <p:cNvPr id="7" name="Content Placeholder 6">
             <a:extLst>
               <a:ext uri="{FF2B5EF4-FFF2-40B4-BE49-F238E27FC236}">
-                <a16:creationId xmlns:a16="http://schemas.microsoft.com/office/drawing/2014/main" id="{B7824BAC-2C64-4E35-AC3B-5452D0F8D2CF}"/>
+                <a16:creationId xmlns:a16="http://schemas.microsoft.com/office/drawing/2014/main" id="{DEA1BA1F-8EDF-40F1-9857-43DB1F419462}"/>
               </a:ext>
             </a:extLst>
           </p:cNvPr>
@@ -6541,8 +7181,8 @@
         </p:blipFill>
         <p:spPr>
           <a:xfrm>
-            <a:off x="781941" y="312644"/>
-            <a:ext cx="5993025" cy="6019196"/>
+            <a:off x="988425" y="640080"/>
+            <a:ext cx="5566815" cy="5577840"/>
           </a:xfrm>
           <a:prstGeom prst="rect">
             <a:avLst/>
@@ -6551,7 +7191,7 @@
       </p:pic>
       <p:sp>
         <p:nvSpPr>
-          <p:cNvPr id="18" name="Rectangle 17">
+          <p:cNvPr id="33" name="Rectangle 32">
             <a:extLst>
               <a:ext uri="{FF2B5EF4-FFF2-40B4-BE49-F238E27FC236}">
                 <a16:creationId xmlns:a16="http://schemas.microsoft.com/office/drawing/2014/main" id="{984BBFDD-E720-4805-A9C8-129FBBF6DD70}"/>
@@ -6609,7 +7249,7 @@
           <p:cNvPr id="2" name="Title 1">
             <a:extLst>
               <a:ext uri="{FF2B5EF4-FFF2-40B4-BE49-F238E27FC236}">
-                <a16:creationId xmlns:a16="http://schemas.microsoft.com/office/drawing/2014/main" id="{6D680BF3-2554-45AA-B6CE-75B86398315A}"/>
+                <a16:creationId xmlns:a16="http://schemas.microsoft.com/office/drawing/2014/main" id="{CF6DE23D-3945-4FDD-880A-69BD56509E9B}"/>
               </a:ext>
             </a:extLst>
           </p:cNvPr>
@@ -6638,14 +7278,19 @@
                   <a:srgbClr val="FFFFFF"/>
                 </a:solidFill>
               </a:rPr>
-              <a:t>All Together</a:t>
-            </a:r>
-          </a:p>
-        </p:txBody>
-      </p:sp>
-      <p:sp>
-        <p:nvSpPr>
-          <p:cNvPr id="20" name="Rectangle 19">
+              <a:t>Drawing the pins</a:t>
+            </a:r>
+            <a:endParaRPr lang="en-US" sz="4400">
+              <a:solidFill>
+                <a:srgbClr val="FFFFFF"/>
+              </a:solidFill>
+            </a:endParaRPr>
+          </a:p>
+        </p:txBody>
+      </p:sp>
+      <p:sp>
+        <p:nvSpPr>
+          <p:cNvPr id="35" name="Rectangle 34">
             <a:extLst>
               <a:ext uri="{FF2B5EF4-FFF2-40B4-BE49-F238E27FC236}">
                 <a16:creationId xmlns:a16="http://schemas.microsoft.com/office/drawing/2014/main" id="{5AC4BE46-4A77-42FE-9D15-065CDB2F847C}"/>
@@ -6701,7 +7346,7 @@
     </p:spTree>
     <p:extLst>
       <p:ext uri="{BB962C8B-B14F-4D97-AF65-F5344CB8AC3E}">
-        <p14:creationId xmlns:p14="http://schemas.microsoft.com/office/powerpoint/2010/main" val="2036783459"/>
+        <p14:creationId xmlns:p14="http://schemas.microsoft.com/office/powerpoint/2010/main" val="4283267399"/>
       </p:ext>
     </p:extLst>
   </p:cSld>
@@ -6714,6 +7359,14 @@
 <file path=ppt/slides/slide9.xml><?xml version="1.0" encoding="utf-8"?>
 <p:sld xmlns:a="http://schemas.openxmlformats.org/drawingml/2006/main" xmlns:r="http://schemas.openxmlformats.org/officeDocument/2006/relationships" xmlns:p="http://schemas.openxmlformats.org/presentationml/2006/main">
   <p:cSld>
+    <p:bg>
+      <p:bgPr>
+        <a:solidFill>
+          <a:schemeClr val="bg1"/>
+        </a:solidFill>
+        <a:effectLst/>
+      </p:bgPr>
+    </p:bg>
     <p:spTree>
       <p:nvGrpSpPr>
         <p:cNvPr id="1" name=""/>
@@ -6730,10 +7383,328 @@
       </p:grpSpPr>
       <p:sp>
         <p:nvSpPr>
+          <p:cNvPr id="37" name="Rectangle 24">
+            <a:extLst>
+              <a:ext uri="{FF2B5EF4-FFF2-40B4-BE49-F238E27FC236}">
+                <a16:creationId xmlns:a16="http://schemas.microsoft.com/office/drawing/2014/main" id="{4E4490D0-3672-446A-AC12-B4830333BDDD}"/>
+              </a:ext>
+              <a:ext uri="{C183D7F6-B498-43B3-948B-1728B52AA6E4}">
+                <adec:decorative xmlns:adec="http://schemas.microsoft.com/office/drawing/2017/decorative" val="1"/>
+              </a:ext>
+            </a:extLst>
+          </p:cNvPr>
+          <p:cNvSpPr>
+            <a:spLocks noGrp="1" noRot="1" noChangeAspect="1" noMove="1" noResize="1" noEditPoints="1" noAdjustHandles="1" noChangeArrowheads="1" noChangeShapeType="1" noTextEdit="1"/>
+          </p:cNvSpPr>
+          <p:nvPr>
+            <p:extLst>
+              <p:ext uri="{386F3935-93C4-4BCD-93E2-E3B085C9AB24}">
+                <p16:designElem xmlns:p16="http://schemas.microsoft.com/office/powerpoint/2015/main" val="1"/>
+              </p:ext>
+            </p:extLst>
+          </p:nvPr>
+        </p:nvSpPr>
+        <p:spPr>
+          <a:xfrm>
+            <a:off x="3175" y="6400800"/>
+            <a:ext cx="12188825" cy="457200"/>
+          </a:xfrm>
+          <a:prstGeom prst="rect">
+            <a:avLst/>
+          </a:prstGeom>
+          <a:solidFill>
+            <a:schemeClr val="accent2"/>
+          </a:solidFill>
+          <a:ln>
+            <a:noFill/>
+          </a:ln>
+        </p:spPr>
+        <p:style>
+          <a:lnRef idx="2">
+            <a:schemeClr val="accent1">
+              <a:shade val="50000"/>
+            </a:schemeClr>
+          </a:lnRef>
+          <a:fillRef idx="1">
+            <a:schemeClr val="accent1"/>
+          </a:fillRef>
+          <a:effectRef idx="0">
+            <a:schemeClr val="accent1"/>
+          </a:effectRef>
+          <a:fontRef idx="minor">
+            <a:schemeClr val="lt1"/>
+          </a:fontRef>
+        </p:style>
+      </p:sp>
+      <p:sp>
+        <p:nvSpPr>
+          <p:cNvPr id="38" name="Rectangle 26">
+            <a:extLst>
+              <a:ext uri="{FF2B5EF4-FFF2-40B4-BE49-F238E27FC236}">
+                <a16:creationId xmlns:a16="http://schemas.microsoft.com/office/drawing/2014/main" id="{39CB82C2-DF65-4EC1-8280-F201D50F570B}"/>
+              </a:ext>
+              <a:ext uri="{C183D7F6-B498-43B3-948B-1728B52AA6E4}">
+                <adec:decorative xmlns:adec="http://schemas.microsoft.com/office/drawing/2017/decorative" val="1"/>
+              </a:ext>
+            </a:extLst>
+          </p:cNvPr>
+          <p:cNvSpPr>
+            <a:spLocks noGrp="1" noRot="1" noChangeAspect="1" noMove="1" noResize="1" noEditPoints="1" noAdjustHandles="1" noChangeArrowheads="1" noChangeShapeType="1" noTextEdit="1"/>
+          </p:cNvSpPr>
+          <p:nvPr>
+            <p:extLst>
+              <p:ext uri="{386F3935-93C4-4BCD-93E2-E3B085C9AB24}">
+                <p16:designElem xmlns:p16="http://schemas.microsoft.com/office/powerpoint/2015/main" val="1"/>
+              </p:ext>
+            </p:extLst>
+          </p:nvPr>
+        </p:nvSpPr>
+        <p:spPr>
+          <a:xfrm>
+            <a:off x="15" y="6334316"/>
+            <a:ext cx="12188825" cy="64008"/>
+          </a:xfrm>
+          <a:prstGeom prst="rect">
+            <a:avLst/>
+          </a:prstGeom>
+          <a:solidFill>
+            <a:schemeClr val="accent1"/>
+          </a:solidFill>
+          <a:ln>
+            <a:noFill/>
+          </a:ln>
+        </p:spPr>
+        <p:style>
+          <a:lnRef idx="2">
+            <a:schemeClr val="accent1">
+              <a:shade val="50000"/>
+            </a:schemeClr>
+          </a:lnRef>
+          <a:fillRef idx="1">
+            <a:schemeClr val="accent1"/>
+          </a:fillRef>
+          <a:effectRef idx="0">
+            <a:schemeClr val="accent1"/>
+          </a:effectRef>
+          <a:fontRef idx="minor">
+            <a:schemeClr val="lt1"/>
+          </a:fontRef>
+        </p:style>
+      </p:sp>
+      <p:cxnSp>
+        <p:nvCxnSpPr>
+          <p:cNvPr id="39" name="Straight Connector 28">
+            <a:extLst>
+              <a:ext uri="{FF2B5EF4-FFF2-40B4-BE49-F238E27FC236}">
+                <a16:creationId xmlns:a16="http://schemas.microsoft.com/office/drawing/2014/main" id="{7E1D4427-852B-4B37-8E76-0E9F1810BA2A}"/>
+              </a:ext>
+              <a:ext uri="{C183D7F6-B498-43B3-948B-1728B52AA6E4}">
+                <adec:decorative xmlns:adec="http://schemas.microsoft.com/office/drawing/2017/decorative" val="1"/>
+              </a:ext>
+            </a:extLst>
+          </p:cNvPr>
+          <p:cNvCxnSpPr>
+            <a:cxnSpLocks noGrp="1" noRot="1" noChangeAspect="1" noMove="1" noResize="1" noEditPoints="1" noAdjustHandles="1" noChangeArrowheads="1" noChangeShapeType="1"/>
+          </p:cNvCxnSpPr>
+          <p:nvPr>
+            <p:extLst>
+              <p:ext uri="{386F3935-93C4-4BCD-93E2-E3B085C9AB24}">
+                <p16:designElem xmlns:p16="http://schemas.microsoft.com/office/powerpoint/2015/main" val="1"/>
+              </p:ext>
+            </p:extLst>
+          </p:nvPr>
+        </p:nvCxnSpPr>
+        <p:spPr>
+          <a:xfrm>
+            <a:off x="1207658" y="4343400"/>
+            <a:ext cx="9875520" cy="0"/>
+          </a:xfrm>
+          <a:prstGeom prst="line">
+            <a:avLst/>
+          </a:prstGeom>
+          <a:ln w="6350">
+            <a:solidFill>
+              <a:schemeClr val="tx1">
+                <a:lumMod val="50000"/>
+                <a:lumOff val="50000"/>
+              </a:schemeClr>
+            </a:solidFill>
+          </a:ln>
+        </p:spPr>
+        <p:style>
+          <a:lnRef idx="1">
+            <a:schemeClr val="accent1"/>
+          </a:lnRef>
+          <a:fillRef idx="0">
+            <a:schemeClr val="accent1"/>
+          </a:fillRef>
+          <a:effectRef idx="0">
+            <a:schemeClr val="accent1"/>
+          </a:effectRef>
+          <a:fontRef idx="minor">
+            <a:schemeClr val="tx1"/>
+          </a:fontRef>
+        </p:style>
+      </p:cxnSp>
+      <p:sp useBgFill="1">
+        <p:nvSpPr>
+          <p:cNvPr id="40" name="Rectangle 30">
+            <a:extLst>
+              <a:ext uri="{FF2B5EF4-FFF2-40B4-BE49-F238E27FC236}">
+                <a16:creationId xmlns:a16="http://schemas.microsoft.com/office/drawing/2014/main" id="{5A1B47C8-47A0-4A88-8830-6DEA3B5DE392}"/>
+              </a:ext>
+              <a:ext uri="{C183D7F6-B498-43B3-948B-1728B52AA6E4}">
+                <adec:decorative xmlns:adec="http://schemas.microsoft.com/office/drawing/2017/decorative" val="1"/>
+              </a:ext>
+            </a:extLst>
+          </p:cNvPr>
+          <p:cNvSpPr>
+            <a:spLocks noGrp="1" noRot="1" noChangeAspect="1" noMove="1" noResize="1" noEditPoints="1" noAdjustHandles="1" noChangeArrowheads="1" noChangeShapeType="1" noTextEdit="1"/>
+          </p:cNvSpPr>
+          <p:nvPr>
+            <p:extLst>
+              <p:ext uri="{386F3935-93C4-4BCD-93E2-E3B085C9AB24}">
+                <p16:designElem xmlns:p16="http://schemas.microsoft.com/office/powerpoint/2015/main" val="1"/>
+              </p:ext>
+            </p:extLst>
+          </p:nvPr>
+        </p:nvSpPr>
+        <p:spPr>
+          <a:xfrm>
+            <a:off x="0" y="0"/>
+            <a:ext cx="12192000" cy="6858000"/>
+          </a:xfrm>
+          <a:prstGeom prst="rect">
+            <a:avLst/>
+          </a:prstGeom>
+          <a:ln>
+            <a:noFill/>
+          </a:ln>
+        </p:spPr>
+        <p:style>
+          <a:lnRef idx="2">
+            <a:schemeClr val="accent1">
+              <a:shade val="50000"/>
+            </a:schemeClr>
+          </a:lnRef>
+          <a:fillRef idx="1001">
+            <a:schemeClr val="lt1"/>
+          </a:fillRef>
+          <a:effectRef idx="0">
+            <a:schemeClr val="accent1"/>
+          </a:effectRef>
+          <a:fontRef idx="minor">
+            <a:schemeClr val="lt1"/>
+          </a:fontRef>
+        </p:style>
+        <p:txBody>
+          <a:bodyPr rtlCol="0" anchor="ctr"/>
+          <a:lstStyle/>
+          <a:p>
+            <a:pPr algn="ctr"/>
+            <a:endParaRPr lang="en-US"/>
+          </a:p>
+        </p:txBody>
+      </p:sp>
+      <p:pic>
+        <p:nvPicPr>
+          <p:cNvPr id="7" name="Content Placeholder 6" descr="A picture containing text&#10;&#10;Description automatically generated">
+            <a:extLst>
+              <a:ext uri="{FF2B5EF4-FFF2-40B4-BE49-F238E27FC236}">
+                <a16:creationId xmlns:a16="http://schemas.microsoft.com/office/drawing/2014/main" id="{27E6FE9C-9AD9-4E8E-ADA9-D1D5B2408EF0}"/>
+              </a:ext>
+            </a:extLst>
+          </p:cNvPr>
+          <p:cNvPicPr>
+            <a:picLocks noGrp="1" noChangeAspect="1"/>
+          </p:cNvPicPr>
+          <p:nvPr>
+            <p:ph idx="1"/>
+          </p:nvPr>
+        </p:nvPicPr>
+        <p:blipFill>
+          <a:blip r:embed="rId2">
+            <a:extLst>
+              <a:ext uri="{28A0092B-C50C-407E-A947-70E740481C1C}">
+                <a14:useLocalDpi xmlns:a14="http://schemas.microsoft.com/office/drawing/2010/main" val="0"/>
+              </a:ext>
+            </a:extLst>
+          </a:blip>
+          <a:stretch>
+            <a:fillRect/>
+          </a:stretch>
+        </p:blipFill>
+        <p:spPr>
+          <a:xfrm>
+            <a:off x="989885" y="640080"/>
+            <a:ext cx="5563894" cy="5577840"/>
+          </a:xfrm>
+          <a:prstGeom prst="rect">
+            <a:avLst/>
+          </a:prstGeom>
+        </p:spPr>
+      </p:pic>
+      <p:sp>
+        <p:nvSpPr>
+          <p:cNvPr id="41" name="Rectangle 32">
+            <a:extLst>
+              <a:ext uri="{FF2B5EF4-FFF2-40B4-BE49-F238E27FC236}">
+                <a16:creationId xmlns:a16="http://schemas.microsoft.com/office/drawing/2014/main" id="{984BBFDD-E720-4805-A9C8-129FBBF6DD70}"/>
+              </a:ext>
+              <a:ext uri="{C183D7F6-B498-43B3-948B-1728B52AA6E4}">
+                <adec:decorative xmlns:adec="http://schemas.microsoft.com/office/drawing/2017/decorative" val="1"/>
+              </a:ext>
+            </a:extLst>
+          </p:cNvPr>
+          <p:cNvSpPr>
+            <a:spLocks noGrp="1" noRot="1" noChangeAspect="1" noMove="1" noResize="1" noEditPoints="1" noAdjustHandles="1" noChangeArrowheads="1" noChangeShapeType="1" noTextEdit="1"/>
+          </p:cNvSpPr>
+          <p:nvPr>
+            <p:extLst>
+              <p:ext uri="{386F3935-93C4-4BCD-93E2-E3B085C9AB24}">
+                <p16:designElem xmlns:p16="http://schemas.microsoft.com/office/powerpoint/2015/main" val="1"/>
+              </p:ext>
+            </p:extLst>
+          </p:nvPr>
+        </p:nvSpPr>
+        <p:spPr bwMode="white">
+          <a:xfrm>
+            <a:off x="7613486" y="0"/>
+            <a:ext cx="4584734" cy="6858000"/>
+          </a:xfrm>
+          <a:prstGeom prst="rect">
+            <a:avLst/>
+          </a:prstGeom>
+          <a:solidFill>
+            <a:schemeClr val="accent2"/>
+          </a:solidFill>
+          <a:ln>
+            <a:noFill/>
+          </a:ln>
+        </p:spPr>
+        <p:style>
+          <a:lnRef idx="2">
+            <a:schemeClr val="accent1">
+              <a:shade val="50000"/>
+            </a:schemeClr>
+          </a:lnRef>
+          <a:fillRef idx="1">
+            <a:schemeClr val="accent1"/>
+          </a:fillRef>
+          <a:effectRef idx="0">
+            <a:schemeClr val="accent1"/>
+          </a:effectRef>
+          <a:fontRef idx="minor">
+            <a:schemeClr val="lt1"/>
+          </a:fontRef>
+        </p:style>
+      </p:sp>
+      <p:sp>
+        <p:nvSpPr>
           <p:cNvPr id="2" name="Title 1">
             <a:extLst>
               <a:ext uri="{FF2B5EF4-FFF2-40B4-BE49-F238E27FC236}">
-                <a16:creationId xmlns:a16="http://schemas.microsoft.com/office/drawing/2014/main" id="{D7DE535C-4172-4F58-8400-017D622E1C3E}"/>
+                <a16:creationId xmlns:a16="http://schemas.microsoft.com/office/drawing/2014/main" id="{895556BE-D89C-4DF8-9788-DC128F33F033}"/>
               </a:ext>
             </a:extLst>
           </p:cNvPr>
@@ -6744,102 +7715,88 @@
             <p:ph type="title"/>
           </p:nvPr>
         </p:nvSpPr>
-        <p:spPr/>
-        <p:txBody>
-          <a:bodyPr/>
+        <p:spPr>
+          <a:xfrm>
+            <a:off x="8096885" y="640080"/>
+            <a:ext cx="3659246" cy="2926080"/>
+          </a:xfrm>
+        </p:spPr>
+        <p:txBody>
+          <a:bodyPr vert="horz" lIns="91440" tIns="45720" rIns="91440" bIns="45720" rtlCol="0" anchor="b">
+            <a:normAutofit/>
+          </a:bodyPr>
           <a:lstStyle/>
           <a:p>
             <a:r>
-              <a:rPr lang="en-US" dirty="0"/>
-              <a:t>Libs/tools used</a:t>
-            </a:r>
-          </a:p>
-        </p:txBody>
-      </p:sp>
-      <p:sp>
-        <p:nvSpPr>
-          <p:cNvPr id="3" name="Content Placeholder 2">
+              <a:rPr lang="en-US" sz="4400">
+                <a:solidFill>
+                  <a:srgbClr val="FFFFFF"/>
+                </a:solidFill>
+              </a:rPr>
+              <a:t>Drawing the Nets</a:t>
+            </a:r>
+          </a:p>
+        </p:txBody>
+      </p:sp>
+      <p:sp>
+        <p:nvSpPr>
+          <p:cNvPr id="42" name="Rectangle 34">
             <a:extLst>
               <a:ext uri="{FF2B5EF4-FFF2-40B4-BE49-F238E27FC236}">
-                <a16:creationId xmlns:a16="http://schemas.microsoft.com/office/drawing/2014/main" id="{8B919E09-3994-42B5-9EEB-5988DDDB3BA2}"/>
+                <a16:creationId xmlns:a16="http://schemas.microsoft.com/office/drawing/2014/main" id="{5AC4BE46-4A77-42FE-9D15-065CDB2F847C}"/>
+              </a:ext>
+              <a:ext uri="{C183D7F6-B498-43B3-948B-1728B52AA6E4}">
+                <adec:decorative xmlns:adec="http://schemas.microsoft.com/office/drawing/2017/decorative" val="1"/>
               </a:ext>
             </a:extLst>
           </p:cNvPr>
           <p:cNvSpPr>
-            <a:spLocks noGrp="1"/>
-          </p:cNvSpPr>
-          <p:nvPr>
-            <p:ph idx="1"/>
-          </p:nvPr>
-        </p:nvSpPr>
-        <p:spPr/>
-        <p:txBody>
-          <a:bodyPr/>
-          <a:lstStyle/>
-          <a:p>
-            <a:r>
-              <a:rPr lang="en-US" dirty="0"/>
-              <a:t>- </a:t>
-            </a:r>
-            <a:r>
-              <a:rPr lang="en-US" dirty="0" err="1"/>
-              <a:t>svgZoomPan</a:t>
-            </a:r>
-            <a:r>
-              <a:rPr lang="en-US" dirty="0"/>
-              <a:t> </a:t>
-            </a:r>
-            <a:r>
-              <a:rPr lang="en-US" sz="1800" u="sng" dirty="0">
-                <a:solidFill>
-                  <a:srgbClr val="0070C0"/>
-                </a:solidFill>
-              </a:rPr>
-              <a:t>https://github.com/ariutta/svg-pan-zoom</a:t>
-            </a:r>
-            <a:endParaRPr lang="en-US" u="sng" dirty="0">
-              <a:solidFill>
-                <a:srgbClr val="0070C0"/>
-              </a:solidFill>
-            </a:endParaRPr>
-          </a:p>
-          <a:p>
-            <a:r>
-              <a:rPr lang="en-US" dirty="0"/>
-              <a:t>- </a:t>
-            </a:r>
-            <a:r>
-              <a:rPr lang="en-US" dirty="0" err="1"/>
-              <a:t>jquery</a:t>
-            </a:r>
-            <a:r>
-              <a:rPr lang="en-US" dirty="0"/>
-              <a:t>, JavaScript, HTML, CSS</a:t>
-            </a:r>
-          </a:p>
-          <a:p>
-            <a:r>
-              <a:rPr lang="en-US" dirty="0"/>
-              <a:t>- DEF and LEF </a:t>
-            </a:r>
-            <a:r>
-              <a:rPr lang="en-US" dirty="0">
-                <a:solidFill>
-                  <a:srgbClr val="0070C0"/>
-                </a:solidFill>
-              </a:rPr>
-              <a:t>parser https://github.com/claude-abounegm/DEF-Viewer/tree/master/DEFViewer/Scripts/Custom</a:t>
-            </a:r>
-          </a:p>
-          <a:p>
-            <a:endParaRPr lang="en-US" dirty="0"/>
-          </a:p>
-        </p:txBody>
+            <a:spLocks noGrp="1" noRot="1" noChangeAspect="1" noMove="1" noResize="1" noEditPoints="1" noAdjustHandles="1" noChangeArrowheads="1" noChangeShapeType="1" noTextEdit="1"/>
+          </p:cNvSpPr>
+          <p:nvPr>
+            <p:extLst>
+              <p:ext uri="{386F3935-93C4-4BCD-93E2-E3B085C9AB24}">
+                <p16:designElem xmlns:p16="http://schemas.microsoft.com/office/powerpoint/2015/main" val="1"/>
+              </p:ext>
+            </p:extLst>
+          </p:nvPr>
+        </p:nvSpPr>
+        <p:spPr>
+          <a:xfrm>
+            <a:off x="7556906" y="0"/>
+            <a:ext cx="64008" cy="6858000"/>
+          </a:xfrm>
+          <a:prstGeom prst="rect">
+            <a:avLst/>
+          </a:prstGeom>
+          <a:solidFill>
+            <a:schemeClr val="accent1"/>
+          </a:solidFill>
+          <a:ln>
+            <a:noFill/>
+          </a:ln>
+        </p:spPr>
+        <p:style>
+          <a:lnRef idx="2">
+            <a:schemeClr val="accent1">
+              <a:shade val="50000"/>
+            </a:schemeClr>
+          </a:lnRef>
+          <a:fillRef idx="1">
+            <a:schemeClr val="accent1"/>
+          </a:fillRef>
+          <a:effectRef idx="0">
+            <a:schemeClr val="accent1"/>
+          </a:effectRef>
+          <a:fontRef idx="minor">
+            <a:schemeClr val="lt1"/>
+          </a:fontRef>
+        </p:style>
       </p:sp>
     </p:spTree>
     <p:extLst>
       <p:ext uri="{BB962C8B-B14F-4D97-AF65-F5344CB8AC3E}">
-        <p14:creationId xmlns:p14="http://schemas.microsoft.com/office/powerpoint/2010/main" val="1259450079"/>
+        <p14:creationId xmlns:p14="http://schemas.microsoft.com/office/powerpoint/2010/main" val="3550077156"/>
       </p:ext>
     </p:extLst>
   </p:cSld>

</xml_diff>

<commit_message>
Updated the remaining work section
</commit_message>
<xml_diff>
--- a/docs/DEF-LEF to SVG.pptx
+++ b/docs/DEF-LEF to SVG.pptx
@@ -354,7 +354,7 @@
           <a:p>
             <a:fld id="{9B4351EA-E64D-462A-8AA0-D6ABA8A204FE}" type="datetimeFigureOut">
               <a:rPr lang="en-US" smtClean="0"/>
-              <a:t>12/3/2019</a:t>
+              <a:t>12/5/2019</a:t>
             </a:fld>
             <a:endParaRPr lang="en-US"/>
           </a:p>
@@ -562,7 +562,7 @@
           <a:p>
             <a:fld id="{9B4351EA-E64D-462A-8AA0-D6ABA8A204FE}" type="datetimeFigureOut">
               <a:rPr lang="en-US" smtClean="0"/>
-              <a:t>12/3/2019</a:t>
+              <a:t>12/5/2019</a:t>
             </a:fld>
             <a:endParaRPr lang="en-US"/>
           </a:p>
@@ -818,7 +818,7 @@
           <a:p>
             <a:fld id="{9B4351EA-E64D-462A-8AA0-D6ABA8A204FE}" type="datetimeFigureOut">
               <a:rPr lang="en-US" smtClean="0"/>
-              <a:t>12/3/2019</a:t>
+              <a:t>12/5/2019</a:t>
             </a:fld>
             <a:endParaRPr lang="en-US"/>
           </a:p>
@@ -992,7 +992,7 @@
           <a:p>
             <a:fld id="{9B4351EA-E64D-462A-8AA0-D6ABA8A204FE}" type="datetimeFigureOut">
               <a:rPr lang="en-US" smtClean="0"/>
-              <a:t>12/3/2019</a:t>
+              <a:t>12/5/2019</a:t>
             </a:fld>
             <a:endParaRPr lang="en-US"/>
           </a:p>
@@ -1335,7 +1335,7 @@
           <a:p>
             <a:fld id="{9B4351EA-E64D-462A-8AA0-D6ABA8A204FE}" type="datetimeFigureOut">
               <a:rPr lang="en-US" smtClean="0"/>
-              <a:t>12/3/2019</a:t>
+              <a:t>12/5/2019</a:t>
             </a:fld>
             <a:endParaRPr lang="en-US"/>
           </a:p>
@@ -1610,7 +1610,7 @@
           <a:p>
             <a:fld id="{9B4351EA-E64D-462A-8AA0-D6ABA8A204FE}" type="datetimeFigureOut">
               <a:rPr lang="en-US" smtClean="0"/>
-              <a:t>12/3/2019</a:t>
+              <a:t>12/5/2019</a:t>
             </a:fld>
             <a:endParaRPr lang="en-US"/>
           </a:p>
@@ -1989,7 +1989,7 @@
           <a:p>
             <a:fld id="{9B4351EA-E64D-462A-8AA0-D6ABA8A204FE}" type="datetimeFigureOut">
               <a:rPr lang="en-US" smtClean="0"/>
-              <a:t>12/3/2019</a:t>
+              <a:t>12/5/2019</a:t>
             </a:fld>
             <a:endParaRPr lang="en-US"/>
           </a:p>
@@ -2107,7 +2107,7 @@
           <a:p>
             <a:fld id="{9B4351EA-E64D-462A-8AA0-D6ABA8A204FE}" type="datetimeFigureOut">
               <a:rPr lang="en-US" smtClean="0"/>
-              <a:t>12/3/2019</a:t>
+              <a:t>12/5/2019</a:t>
             </a:fld>
             <a:endParaRPr lang="en-US"/>
           </a:p>
@@ -2278,7 +2278,7 @@
           <a:p>
             <a:fld id="{9B4351EA-E64D-462A-8AA0-D6ABA8A204FE}" type="datetimeFigureOut">
               <a:rPr lang="en-US" smtClean="0"/>
-              <a:t>12/3/2019</a:t>
+              <a:t>12/5/2019</a:t>
             </a:fld>
             <a:endParaRPr lang="en-US"/>
           </a:p>
@@ -2632,7 +2632,7 @@
           <a:p>
             <a:fld id="{9B4351EA-E64D-462A-8AA0-D6ABA8A204FE}" type="datetimeFigureOut">
               <a:rPr lang="en-US" smtClean="0"/>
-              <a:t>12/3/2019</a:t>
+              <a:t>12/5/2019</a:t>
             </a:fld>
             <a:endParaRPr lang="en-US"/>
           </a:p>
@@ -3014,7 +3014,7 @@
           <a:p>
             <a:fld id="{9B4351EA-E64D-462A-8AA0-D6ABA8A204FE}" type="datetimeFigureOut">
               <a:rPr lang="en-US" smtClean="0"/>
-              <a:t>12/3/2019</a:t>
+              <a:t>12/5/2019</a:t>
             </a:fld>
             <a:endParaRPr lang="en-US"/>
           </a:p>
@@ -3301,7 +3301,7 @@
           <a:p>
             <a:fld id="{9B4351EA-E64D-462A-8AA0-D6ABA8A204FE}" type="datetimeFigureOut">
               <a:rPr lang="en-US" smtClean="0"/>
-              <a:t>12/3/2019</a:t>
+              <a:t>12/5/2019</a:t>
             </a:fld>
             <a:endParaRPr lang="en-US"/>
           </a:p>
@@ -3961,7 +3961,7 @@
                 <a16:creationId xmlns:a16="http://schemas.microsoft.com/office/drawing/2014/main" id="{4E4490D0-3672-446A-AC12-B4830333BDDD}"/>
               </a:ext>
               <a:ext uri="{C183D7F6-B498-43B3-948B-1728B52AA6E4}">
-                <adec:decorative xmlns:adec="http://schemas.microsoft.com/office/drawing/2017/decorative" val="1"/>
+                <adec:decorative xmlns:adec="http://schemas.microsoft.com/office/drawing/2017/decorative" xmlns="" val="1"/>
               </a:ext>
             </a:extLst>
           </p:cNvPr>
@@ -4016,7 +4016,7 @@
                 <a16:creationId xmlns:a16="http://schemas.microsoft.com/office/drawing/2014/main" id="{39CB82C2-DF65-4EC1-8280-F201D50F570B}"/>
               </a:ext>
               <a:ext uri="{C183D7F6-B498-43B3-948B-1728B52AA6E4}">
-                <adec:decorative xmlns:adec="http://schemas.microsoft.com/office/drawing/2017/decorative" val="1"/>
+                <adec:decorative xmlns:adec="http://schemas.microsoft.com/office/drawing/2017/decorative" xmlns="" val="1"/>
               </a:ext>
             </a:extLst>
           </p:cNvPr>
@@ -4071,7 +4071,7 @@
                 <a16:creationId xmlns:a16="http://schemas.microsoft.com/office/drawing/2014/main" id="{7E1D4427-852B-4B37-8E76-0E9F1810BA2A}"/>
               </a:ext>
               <a:ext uri="{C183D7F6-B498-43B3-948B-1728B52AA6E4}">
-                <adec:decorative xmlns:adec="http://schemas.microsoft.com/office/drawing/2017/decorative" val="1"/>
+                <adec:decorative xmlns:adec="http://schemas.microsoft.com/office/drawing/2017/decorative" xmlns="" val="1"/>
               </a:ext>
             </a:extLst>
           </p:cNvPr>
@@ -4126,7 +4126,7 @@
                 <a16:creationId xmlns:a16="http://schemas.microsoft.com/office/drawing/2014/main" id="{5A1B47C8-47A0-4A88-8830-6DEA3B5DE392}"/>
               </a:ext>
               <a:ext uri="{C183D7F6-B498-43B3-948B-1728B52AA6E4}">
-                <adec:decorative xmlns:adec="http://schemas.microsoft.com/office/drawing/2017/decorative" val="1"/>
+                <adec:decorative xmlns:adec="http://schemas.microsoft.com/office/drawing/2017/decorative" xmlns="" val="1"/>
               </a:ext>
             </a:extLst>
           </p:cNvPr>
@@ -4224,7 +4224,7 @@
                 <a16:creationId xmlns:a16="http://schemas.microsoft.com/office/drawing/2014/main" id="{984BBFDD-E720-4805-A9C8-129FBBF6DD70}"/>
               </a:ext>
               <a:ext uri="{C183D7F6-B498-43B3-948B-1728B52AA6E4}">
-                <adec:decorative xmlns:adec="http://schemas.microsoft.com/office/drawing/2017/decorative" val="1"/>
+                <adec:decorative xmlns:adec="http://schemas.microsoft.com/office/drawing/2017/decorative" xmlns="" val="1"/>
               </a:ext>
             </a:extLst>
           </p:cNvPr>
@@ -4318,7 +4318,7 @@
                 <a16:creationId xmlns:a16="http://schemas.microsoft.com/office/drawing/2014/main" id="{5AC4BE46-4A77-42FE-9D15-065CDB2F847C}"/>
               </a:ext>
               <a:ext uri="{C183D7F6-B498-43B3-948B-1728B52AA6E4}">
-                <adec:decorative xmlns:adec="http://schemas.microsoft.com/office/drawing/2017/decorative" val="1"/>
+                <adec:decorative xmlns:adec="http://schemas.microsoft.com/office/drawing/2017/decorative" xmlns="" val="1"/>
               </a:ext>
             </a:extLst>
           </p:cNvPr>
@@ -4910,8 +4910,36 @@
           <a:p>
             <a:r>
               <a:rPr lang="en-US" dirty="0"/>
-              <a:t>-  Graphically showing the DRC errors</a:t>
-            </a:r>
+              <a:t>- </a:t>
+            </a:r>
+            <a:r>
+              <a:rPr lang="en-US" dirty="0" smtClean="0"/>
+              <a:t>Adding DRC error checking for </a:t>
+            </a:r>
+            <a:r>
+              <a:rPr lang="en-US" dirty="0" err="1" smtClean="0"/>
+              <a:t>Vias</a:t>
+            </a:r>
+            <a:endParaRPr lang="en-US" dirty="0" smtClean="0"/>
+          </a:p>
+          <a:p>
+            <a:r>
+              <a:rPr lang="en-US" dirty="0" smtClean="0"/>
+              <a:t>- Improving the UI colors</a:t>
+            </a:r>
+          </a:p>
+          <a:p>
+            <a:r>
+              <a:rPr lang="en-US" dirty="0" smtClean="0"/>
+              <a:t>- Testing the compatibility on different browsers</a:t>
+            </a:r>
+          </a:p>
+          <a:p>
+            <a:r>
+              <a:rPr lang="en-US" dirty="0" smtClean="0"/>
+              <a:t>- More testing!</a:t>
+            </a:r>
+            <a:endParaRPr lang="en-US" dirty="0"/>
           </a:p>
         </p:txBody>
       </p:sp>
@@ -5168,7 +5196,7 @@
                 <a16:creationId xmlns:a16="http://schemas.microsoft.com/office/drawing/2014/main" id="{52C0B2E1-0268-42EC-ABD3-94F81A05BCBD}"/>
               </a:ext>
               <a:ext uri="{C183D7F6-B498-43B3-948B-1728B52AA6E4}">
-                <adec:decorative xmlns:adec="http://schemas.microsoft.com/office/drawing/2017/decorative" val="1"/>
+                <adec:decorative xmlns:adec="http://schemas.microsoft.com/office/drawing/2017/decorative" xmlns="" val="1"/>
               </a:ext>
             </a:extLst>
           </p:cNvPr>
@@ -5223,7 +5251,7 @@
                 <a16:creationId xmlns:a16="http://schemas.microsoft.com/office/drawing/2014/main" id="{7D2256B4-48EA-40FC-BBC0-AA1EE6E0080C}"/>
               </a:ext>
               <a:ext uri="{C183D7F6-B498-43B3-948B-1728B52AA6E4}">
-                <adec:decorative xmlns:adec="http://schemas.microsoft.com/office/drawing/2017/decorative" val="1"/>
+                <adec:decorative xmlns:adec="http://schemas.microsoft.com/office/drawing/2017/decorative" xmlns="" val="1"/>
               </a:ext>
             </a:extLst>
           </p:cNvPr>
@@ -5278,7 +5306,7 @@
                 <a16:creationId xmlns:a16="http://schemas.microsoft.com/office/drawing/2014/main" id="{3D44BCCA-102D-4A9D-B1E4-2450CAF0B05E}"/>
               </a:ext>
               <a:ext uri="{C183D7F6-B498-43B3-948B-1728B52AA6E4}">
-                <adec:decorative xmlns:adec="http://schemas.microsoft.com/office/drawing/2017/decorative" val="1"/>
+                <adec:decorative xmlns:adec="http://schemas.microsoft.com/office/drawing/2017/decorative" xmlns="" val="1"/>
               </a:ext>
             </a:extLst>
           </p:cNvPr>
@@ -5333,7 +5361,7 @@
                 <a16:creationId xmlns:a16="http://schemas.microsoft.com/office/drawing/2014/main" id="{FBDCECDC-EEE3-4128-AA5E-82A8C08796E8}"/>
               </a:ext>
               <a:ext uri="{C183D7F6-B498-43B3-948B-1728B52AA6E4}">
-                <adec:decorative xmlns:adec="http://schemas.microsoft.com/office/drawing/2017/decorative" val="1"/>
+                <adec:decorative xmlns:adec="http://schemas.microsoft.com/office/drawing/2017/decorative" xmlns="" val="1"/>
               </a:ext>
             </a:extLst>
           </p:cNvPr>
@@ -5435,7 +5463,7 @@
                 <a16:creationId xmlns:a16="http://schemas.microsoft.com/office/drawing/2014/main" id="{4260EDE0-989C-4E16-AF94-F652294D828E}"/>
               </a:ext>
               <a:ext uri="{C183D7F6-B498-43B3-948B-1728B52AA6E4}">
-                <adec:decorative xmlns:adec="http://schemas.microsoft.com/office/drawing/2017/decorative" val="1"/>
+                <adec:decorative xmlns:adec="http://schemas.microsoft.com/office/drawing/2017/decorative" xmlns="" val="1"/>
               </a:ext>
             </a:extLst>
           </p:cNvPr>
@@ -5490,7 +5518,7 @@
                 <a16:creationId xmlns:a16="http://schemas.microsoft.com/office/drawing/2014/main" id="{1F3985C0-E548-44D2-B30E-F3E42DADE133}"/>
               </a:ext>
               <a:ext uri="{C183D7F6-B498-43B3-948B-1728B52AA6E4}">
-                <adec:decorative xmlns:adec="http://schemas.microsoft.com/office/drawing/2017/decorative" val="1"/>
+                <adec:decorative xmlns:adec="http://schemas.microsoft.com/office/drawing/2017/decorative" xmlns="" val="1"/>
               </a:ext>
             </a:extLst>
           </p:cNvPr>
@@ -6484,7 +6512,7 @@
                 <a16:creationId xmlns:a16="http://schemas.microsoft.com/office/drawing/2014/main" id="{4E4490D0-3672-446A-AC12-B4830333BDDD}"/>
               </a:ext>
               <a:ext uri="{C183D7F6-B498-43B3-948B-1728B52AA6E4}">
-                <adec:decorative xmlns:adec="http://schemas.microsoft.com/office/drawing/2017/decorative" val="1"/>
+                <adec:decorative xmlns:adec="http://schemas.microsoft.com/office/drawing/2017/decorative" xmlns="" val="1"/>
               </a:ext>
             </a:extLst>
           </p:cNvPr>
@@ -6539,7 +6567,7 @@
                 <a16:creationId xmlns:a16="http://schemas.microsoft.com/office/drawing/2014/main" id="{39CB82C2-DF65-4EC1-8280-F201D50F570B}"/>
               </a:ext>
               <a:ext uri="{C183D7F6-B498-43B3-948B-1728B52AA6E4}">
-                <adec:decorative xmlns:adec="http://schemas.microsoft.com/office/drawing/2017/decorative" val="1"/>
+                <adec:decorative xmlns:adec="http://schemas.microsoft.com/office/drawing/2017/decorative" xmlns="" val="1"/>
               </a:ext>
             </a:extLst>
           </p:cNvPr>
@@ -6594,7 +6622,7 @@
                 <a16:creationId xmlns:a16="http://schemas.microsoft.com/office/drawing/2014/main" id="{7E1D4427-852B-4B37-8E76-0E9F1810BA2A}"/>
               </a:ext>
               <a:ext uri="{C183D7F6-B498-43B3-948B-1728B52AA6E4}">
-                <adec:decorative xmlns:adec="http://schemas.microsoft.com/office/drawing/2017/decorative" val="1"/>
+                <adec:decorative xmlns:adec="http://schemas.microsoft.com/office/drawing/2017/decorative" xmlns="" val="1"/>
               </a:ext>
             </a:extLst>
           </p:cNvPr>
@@ -6649,7 +6677,7 @@
                 <a16:creationId xmlns:a16="http://schemas.microsoft.com/office/drawing/2014/main" id="{5A1B47C8-47A0-4A88-8830-6DEA3B5DE392}"/>
               </a:ext>
               <a:ext uri="{C183D7F6-B498-43B3-948B-1728B52AA6E4}">
-                <adec:decorative xmlns:adec="http://schemas.microsoft.com/office/drawing/2017/decorative" val="1"/>
+                <adec:decorative xmlns:adec="http://schemas.microsoft.com/office/drawing/2017/decorative" xmlns="" val="1"/>
               </a:ext>
             </a:extLst>
           </p:cNvPr>
@@ -6747,7 +6775,7 @@
                 <a16:creationId xmlns:a16="http://schemas.microsoft.com/office/drawing/2014/main" id="{984BBFDD-E720-4805-A9C8-129FBBF6DD70}"/>
               </a:ext>
               <a:ext uri="{C183D7F6-B498-43B3-948B-1728B52AA6E4}">
-                <adec:decorative xmlns:adec="http://schemas.microsoft.com/office/drawing/2017/decorative" val="1"/>
+                <adec:decorative xmlns:adec="http://schemas.microsoft.com/office/drawing/2017/decorative" xmlns="" val="1"/>
               </a:ext>
             </a:extLst>
           </p:cNvPr>
@@ -6841,7 +6869,7 @@
                 <a16:creationId xmlns:a16="http://schemas.microsoft.com/office/drawing/2014/main" id="{5AC4BE46-4A77-42FE-9D15-065CDB2F847C}"/>
               </a:ext>
               <a:ext uri="{C183D7F6-B498-43B3-948B-1728B52AA6E4}">
-                <adec:decorative xmlns:adec="http://schemas.microsoft.com/office/drawing/2017/decorative" val="1"/>
+                <adec:decorative xmlns:adec="http://schemas.microsoft.com/office/drawing/2017/decorative" xmlns="" val="1"/>
               </a:ext>
             </a:extLst>
           </p:cNvPr>
@@ -6934,7 +6962,7 @@
                 <a16:creationId xmlns:a16="http://schemas.microsoft.com/office/drawing/2014/main" id="{4E4490D0-3672-446A-AC12-B4830333BDDD}"/>
               </a:ext>
               <a:ext uri="{C183D7F6-B498-43B3-948B-1728B52AA6E4}">
-                <adec:decorative xmlns:adec="http://schemas.microsoft.com/office/drawing/2017/decorative" val="1"/>
+                <adec:decorative xmlns:adec="http://schemas.microsoft.com/office/drawing/2017/decorative" xmlns="" val="1"/>
               </a:ext>
             </a:extLst>
           </p:cNvPr>
@@ -6989,7 +7017,7 @@
                 <a16:creationId xmlns:a16="http://schemas.microsoft.com/office/drawing/2014/main" id="{39CB82C2-DF65-4EC1-8280-F201D50F570B}"/>
               </a:ext>
               <a:ext uri="{C183D7F6-B498-43B3-948B-1728B52AA6E4}">
-                <adec:decorative xmlns:adec="http://schemas.microsoft.com/office/drawing/2017/decorative" val="1"/>
+                <adec:decorative xmlns:adec="http://schemas.microsoft.com/office/drawing/2017/decorative" xmlns="" val="1"/>
               </a:ext>
             </a:extLst>
           </p:cNvPr>
@@ -7044,7 +7072,7 @@
                 <a16:creationId xmlns:a16="http://schemas.microsoft.com/office/drawing/2014/main" id="{7E1D4427-852B-4B37-8E76-0E9F1810BA2A}"/>
               </a:ext>
               <a:ext uri="{C183D7F6-B498-43B3-948B-1728B52AA6E4}">
-                <adec:decorative xmlns:adec="http://schemas.microsoft.com/office/drawing/2017/decorative" val="1"/>
+                <adec:decorative xmlns:adec="http://schemas.microsoft.com/office/drawing/2017/decorative" xmlns="" val="1"/>
               </a:ext>
             </a:extLst>
           </p:cNvPr>
@@ -7099,7 +7127,7 @@
                 <a16:creationId xmlns:a16="http://schemas.microsoft.com/office/drawing/2014/main" id="{5A1B47C8-47A0-4A88-8830-6DEA3B5DE392}"/>
               </a:ext>
               <a:ext uri="{C183D7F6-B498-43B3-948B-1728B52AA6E4}">
-                <adec:decorative xmlns:adec="http://schemas.microsoft.com/office/drawing/2017/decorative" val="1"/>
+                <adec:decorative xmlns:adec="http://schemas.microsoft.com/office/drawing/2017/decorative" xmlns="" val="1"/>
               </a:ext>
             </a:extLst>
           </p:cNvPr>
@@ -7197,7 +7225,7 @@
                 <a16:creationId xmlns:a16="http://schemas.microsoft.com/office/drawing/2014/main" id="{984BBFDD-E720-4805-A9C8-129FBBF6DD70}"/>
               </a:ext>
               <a:ext uri="{C183D7F6-B498-43B3-948B-1728B52AA6E4}">
-                <adec:decorative xmlns:adec="http://schemas.microsoft.com/office/drawing/2017/decorative" val="1"/>
+                <adec:decorative xmlns:adec="http://schemas.microsoft.com/office/drawing/2017/decorative" xmlns="" val="1"/>
               </a:ext>
             </a:extLst>
           </p:cNvPr>
@@ -7296,7 +7324,7 @@
                 <a16:creationId xmlns:a16="http://schemas.microsoft.com/office/drawing/2014/main" id="{5AC4BE46-4A77-42FE-9D15-065CDB2F847C}"/>
               </a:ext>
               <a:ext uri="{C183D7F6-B498-43B3-948B-1728B52AA6E4}">
-                <adec:decorative xmlns:adec="http://schemas.microsoft.com/office/drawing/2017/decorative" val="1"/>
+                <adec:decorative xmlns:adec="http://schemas.microsoft.com/office/drawing/2017/decorative" xmlns="" val="1"/>
               </a:ext>
             </a:extLst>
           </p:cNvPr>
@@ -7389,7 +7417,7 @@
                 <a16:creationId xmlns:a16="http://schemas.microsoft.com/office/drawing/2014/main" id="{4E4490D0-3672-446A-AC12-B4830333BDDD}"/>
               </a:ext>
               <a:ext uri="{C183D7F6-B498-43B3-948B-1728B52AA6E4}">
-                <adec:decorative xmlns:adec="http://schemas.microsoft.com/office/drawing/2017/decorative" val="1"/>
+                <adec:decorative xmlns:adec="http://schemas.microsoft.com/office/drawing/2017/decorative" xmlns="" val="1"/>
               </a:ext>
             </a:extLst>
           </p:cNvPr>
@@ -7444,7 +7472,7 @@
                 <a16:creationId xmlns:a16="http://schemas.microsoft.com/office/drawing/2014/main" id="{39CB82C2-DF65-4EC1-8280-F201D50F570B}"/>
               </a:ext>
               <a:ext uri="{C183D7F6-B498-43B3-948B-1728B52AA6E4}">
-                <adec:decorative xmlns:adec="http://schemas.microsoft.com/office/drawing/2017/decorative" val="1"/>
+                <adec:decorative xmlns:adec="http://schemas.microsoft.com/office/drawing/2017/decorative" xmlns="" val="1"/>
               </a:ext>
             </a:extLst>
           </p:cNvPr>
@@ -7499,7 +7527,7 @@
                 <a16:creationId xmlns:a16="http://schemas.microsoft.com/office/drawing/2014/main" id="{7E1D4427-852B-4B37-8E76-0E9F1810BA2A}"/>
               </a:ext>
               <a:ext uri="{C183D7F6-B498-43B3-948B-1728B52AA6E4}">
-                <adec:decorative xmlns:adec="http://schemas.microsoft.com/office/drawing/2017/decorative" val="1"/>
+                <adec:decorative xmlns:adec="http://schemas.microsoft.com/office/drawing/2017/decorative" xmlns="" val="1"/>
               </a:ext>
             </a:extLst>
           </p:cNvPr>
@@ -7554,7 +7582,7 @@
                 <a16:creationId xmlns:a16="http://schemas.microsoft.com/office/drawing/2014/main" id="{5A1B47C8-47A0-4A88-8830-6DEA3B5DE392}"/>
               </a:ext>
               <a:ext uri="{C183D7F6-B498-43B3-948B-1728B52AA6E4}">
-                <adec:decorative xmlns:adec="http://schemas.microsoft.com/office/drawing/2017/decorative" val="1"/>
+                <adec:decorative xmlns:adec="http://schemas.microsoft.com/office/drawing/2017/decorative" xmlns="" val="1"/>
               </a:ext>
             </a:extLst>
           </p:cNvPr>
@@ -7652,7 +7680,7 @@
                 <a16:creationId xmlns:a16="http://schemas.microsoft.com/office/drawing/2014/main" id="{984BBFDD-E720-4805-A9C8-129FBBF6DD70}"/>
               </a:ext>
               <a:ext uri="{C183D7F6-B498-43B3-948B-1728B52AA6E4}">
-                <adec:decorative xmlns:adec="http://schemas.microsoft.com/office/drawing/2017/decorative" val="1"/>
+                <adec:decorative xmlns:adec="http://schemas.microsoft.com/office/drawing/2017/decorative" xmlns="" val="1"/>
               </a:ext>
             </a:extLst>
           </p:cNvPr>
@@ -7746,7 +7774,7 @@
                 <a16:creationId xmlns:a16="http://schemas.microsoft.com/office/drawing/2014/main" id="{5AC4BE46-4A77-42FE-9D15-065CDB2F847C}"/>
               </a:ext>
               <a:ext uri="{C183D7F6-B498-43B3-948B-1728B52AA6E4}">
-                <adec:decorative xmlns:adec="http://schemas.microsoft.com/office/drawing/2017/decorative" val="1"/>
+                <adec:decorative xmlns:adec="http://schemas.microsoft.com/office/drawing/2017/decorative" xmlns="" val="1"/>
               </a:ext>
             </a:extLst>
           </p:cNvPr>

</xml_diff>